<commit_message>
added pictures for python part in powerpoint
</commit_message>
<xml_diff>
--- a/Groupwork ppt.pptx
+++ b/Groupwork ppt.pptx
@@ -5,22 +5,25 @@
     <p:sldMasterId id="2147483648" r:id="rId4"/>
   </p:sldMasterIdLst>
   <p:notesMasterIdLst>
-    <p:notesMasterId r:id="rId15"/>
+    <p:notesMasterId r:id="rId18"/>
   </p:notesMasterIdLst>
   <p:handoutMasterIdLst>
-    <p:handoutMasterId r:id="rId16"/>
+    <p:handoutMasterId r:id="rId19"/>
   </p:handoutMasterIdLst>
   <p:sldIdLst>
     <p:sldId id="419" r:id="rId5"/>
     <p:sldId id="422" r:id="rId6"/>
     <p:sldId id="420" r:id="rId7"/>
     <p:sldId id="421" r:id="rId8"/>
-    <p:sldId id="423" r:id="rId9"/>
-    <p:sldId id="424" r:id="rId10"/>
-    <p:sldId id="425" r:id="rId11"/>
-    <p:sldId id="426" r:id="rId12"/>
-    <p:sldId id="427" r:id="rId13"/>
-    <p:sldId id="428" r:id="rId14"/>
+    <p:sldId id="431" r:id="rId9"/>
+    <p:sldId id="429" r:id="rId10"/>
+    <p:sldId id="430" r:id="rId11"/>
+    <p:sldId id="423" r:id="rId12"/>
+    <p:sldId id="424" r:id="rId13"/>
+    <p:sldId id="425" r:id="rId14"/>
+    <p:sldId id="426" r:id="rId15"/>
+    <p:sldId id="427" r:id="rId16"/>
+    <p:sldId id="428" r:id="rId17"/>
   </p:sldIdLst>
   <p:sldSz cx="9144000" cy="5143500" type="screen16x9"/>
   <p:notesSz cx="6784975" cy="9906000"/>
@@ -3947,14 +3950,14 @@
           </a:ln>
           <a:extLst>
             <a:ext uri="{909E8E84-426E-40dd-AFC4-6F175D3DCCD1}">
-              <a14:hiddenFill xmlns:a14="http://schemas.microsoft.com/office/drawing/2010/main" xmlns="">
+              <a14:hiddenFill xmlns="" xmlns:a14="http://schemas.microsoft.com/office/drawing/2010/main">
                 <a:solidFill>
                   <a:srgbClr val="FFFFFF"/>
                 </a:solidFill>
               </a14:hiddenFill>
             </a:ext>
             <a:ext uri="{91240B29-F687-4f45-9708-019B960494DF}">
-              <a14:hiddenLine xmlns:a14="http://schemas.microsoft.com/office/drawing/2010/main" xmlns="" w="9525">
+              <a14:hiddenLine xmlns="" xmlns:a14="http://schemas.microsoft.com/office/drawing/2010/main" w="9525">
                 <a:solidFill>
                   <a:srgbClr val="000000"/>
                 </a:solidFill>
@@ -3964,7 +3967,7 @@
               </a14:hiddenLine>
             </a:ext>
             <a:ext uri="{FAA26D3D-D897-4be2-8F04-BA451C77F1D7}">
-              <ma14:placeholderFlag xmlns:ma14="http://schemas.microsoft.com/office/mac/drawingml/2011/main" xmlns="" val="1"/>
+              <ma14:placeholderFlag xmlns="" xmlns:ma14="http://schemas.microsoft.com/office/mac/drawingml/2011/main" val="1"/>
             </a:ext>
           </a:extLst>
         </p:spPr>
@@ -4008,14 +4011,14 @@
           </a:ln>
           <a:extLst>
             <a:ext uri="{909E8E84-426E-40dd-AFC4-6F175D3DCCD1}">
-              <a14:hiddenFill xmlns:a14="http://schemas.microsoft.com/office/drawing/2010/main" xmlns="">
+              <a14:hiddenFill xmlns="" xmlns:a14="http://schemas.microsoft.com/office/drawing/2010/main">
                 <a:solidFill>
                   <a:srgbClr val="FFFFFF"/>
                 </a:solidFill>
               </a14:hiddenFill>
             </a:ext>
             <a:ext uri="{91240B29-F687-4f45-9708-019B960494DF}">
-              <a14:hiddenLine xmlns:a14="http://schemas.microsoft.com/office/drawing/2010/main" xmlns="" w="9525">
+              <a14:hiddenLine xmlns="" xmlns:a14="http://schemas.microsoft.com/office/drawing/2010/main" w="9525">
                 <a:solidFill>
                   <a:srgbClr val="000000"/>
                 </a:solidFill>
@@ -4025,7 +4028,7 @@
               </a14:hiddenLine>
             </a:ext>
             <a:ext uri="{FAA26D3D-D897-4be2-8F04-BA451C77F1D7}">
-              <ma14:placeholderFlag xmlns:ma14="http://schemas.microsoft.com/office/mac/drawingml/2011/main" xmlns="" val="1"/>
+              <ma14:placeholderFlag xmlns="" xmlns:ma14="http://schemas.microsoft.com/office/mac/drawingml/2011/main" val="1"/>
             </a:ext>
           </a:extLst>
         </p:spPr>
@@ -4740,6 +4743,366 @@
   <p:cSld>
     <p:spTree>
       <p:nvGrpSpPr>
+        <p:cNvPr id="1" name=""/>
+        <p:cNvGrpSpPr/>
+        <p:nvPr/>
+      </p:nvGrpSpPr>
+      <p:grpSpPr>
+        <a:xfrm>
+          <a:off x="0" y="0"/>
+          <a:ext cx="0" cy="0"/>
+          <a:chOff x="0" y="0"/>
+          <a:chExt cx="0" cy="0"/>
+        </a:xfrm>
+      </p:grpSpPr>
+      <p:sp>
+        <p:nvSpPr>
+          <p:cNvPr id="4" name="Slide Number Placeholder 3">
+            <a:extLst>
+              <a:ext uri="{FF2B5EF4-FFF2-40B4-BE49-F238E27FC236}">
+                <a16:creationId xmlns:a16="http://schemas.microsoft.com/office/drawing/2014/main" id="{1C34CFB4-E244-A565-272C-28076862287A}"/>
+              </a:ext>
+            </a:extLst>
+          </p:cNvPr>
+          <p:cNvSpPr>
+            <a:spLocks noGrp="1"/>
+          </p:cNvSpPr>
+          <p:nvPr>
+            <p:ph type="sldNum" sz="quarter" idx="4"/>
+          </p:nvPr>
+        </p:nvSpPr>
+        <p:spPr/>
+        <p:txBody>
+          <a:bodyPr/>
+          <a:lstStyle/>
+          <a:p>
+            <a:fld id="{610C4E4B-DC7F-8F40-B47C-DF522102C54B}" type="slidenum">
+              <a:rPr lang="sv-SE" smtClean="0"/>
+              <a:pPr/>
+              <a:t>10</a:t>
+            </a:fld>
+            <a:endParaRPr lang="sv-SE" dirty="0"/>
+          </a:p>
+        </p:txBody>
+      </p:sp>
+      <p:pic>
+        <p:nvPicPr>
+          <p:cNvPr id="6" name="Picture 5" descr="A screenshot of a computer program&#10;&#10;Description automatically generated">
+            <a:extLst>
+              <a:ext uri="{FF2B5EF4-FFF2-40B4-BE49-F238E27FC236}">
+                <a16:creationId xmlns:a16="http://schemas.microsoft.com/office/drawing/2014/main" id="{99C2D10F-91A8-7556-F5D7-5641C63B6793}"/>
+              </a:ext>
+            </a:extLst>
+          </p:cNvPr>
+          <p:cNvPicPr>
+            <a:picLocks noChangeAspect="1"/>
+          </p:cNvPicPr>
+          <p:nvPr/>
+        </p:nvPicPr>
+        <p:blipFill>
+          <a:blip r:embed="rId2"/>
+          <a:stretch>
+            <a:fillRect/>
+          </a:stretch>
+        </p:blipFill>
+        <p:spPr>
+          <a:xfrm>
+            <a:off x="184770" y="269488"/>
+            <a:ext cx="6502632" cy="4480932"/>
+          </a:xfrm>
+          <a:prstGeom prst="rect">
+            <a:avLst/>
+          </a:prstGeom>
+        </p:spPr>
+      </p:pic>
+    </p:spTree>
+    <p:extLst>
+      <p:ext uri="{BB962C8B-B14F-4D97-AF65-F5344CB8AC3E}">
+        <p14:creationId xmlns:p14="http://schemas.microsoft.com/office/powerpoint/2010/main" val="1247306074"/>
+      </p:ext>
+    </p:extLst>
+  </p:cSld>
+  <p:clrMapOvr>
+    <a:masterClrMapping/>
+  </p:clrMapOvr>
+</p:sld>
+</file>
+
+<file path=ppt/slides/slide11.xml><?xml version="1.0" encoding="utf-8"?>
+<p:sld xmlns:a="http://schemas.openxmlformats.org/drawingml/2006/main" xmlns:r="http://schemas.openxmlformats.org/officeDocument/2006/relationships" xmlns:p="http://schemas.openxmlformats.org/presentationml/2006/main">
+  <p:cSld>
+    <p:spTree>
+      <p:nvGrpSpPr>
+        <p:cNvPr id="1" name="">
+          <a:extLst>
+            <a:ext uri="{FF2B5EF4-FFF2-40B4-BE49-F238E27FC236}">
+              <a16:creationId xmlns:a16="http://schemas.microsoft.com/office/drawing/2014/main" id="{9A2D378D-9D94-F325-C647-A3C8C043D55B}"/>
+            </a:ext>
+          </a:extLst>
+        </p:cNvPr>
+        <p:cNvGrpSpPr/>
+        <p:nvPr/>
+      </p:nvGrpSpPr>
+      <p:grpSpPr>
+        <a:xfrm>
+          <a:off x="0" y="0"/>
+          <a:ext cx="0" cy="0"/>
+          <a:chOff x="0" y="0"/>
+          <a:chExt cx="0" cy="0"/>
+        </a:xfrm>
+      </p:grpSpPr>
+      <p:sp>
+        <p:nvSpPr>
+          <p:cNvPr id="2" name="Rubrik 1">
+            <a:extLst>
+              <a:ext uri="{FF2B5EF4-FFF2-40B4-BE49-F238E27FC236}">
+                <a16:creationId xmlns:a16="http://schemas.microsoft.com/office/drawing/2014/main" id="{7B8832C8-A86B-1438-6DD5-898CBCB0DBE4}"/>
+              </a:ext>
+            </a:extLst>
+          </p:cNvPr>
+          <p:cNvSpPr>
+            <a:spLocks noGrp="1"/>
+          </p:cNvSpPr>
+          <p:nvPr>
+            <p:ph type="ctrTitle"/>
+          </p:nvPr>
+        </p:nvSpPr>
+        <p:spPr>
+          <a:xfrm>
+            <a:off x="267447" y="342766"/>
+            <a:ext cx="4017682" cy="631025"/>
+          </a:xfrm>
+        </p:spPr>
+        <p:txBody>
+          <a:bodyPr/>
+          <a:lstStyle/>
+          <a:p>
+            <a:r>
+              <a:rPr lang="sv-SE" dirty="0"/>
+              <a:t>4. Java</a:t>
+            </a:r>
+          </a:p>
+        </p:txBody>
+      </p:sp>
+      <p:sp>
+        <p:nvSpPr>
+          <p:cNvPr id="3" name="Underrubrik 2">
+            <a:extLst>
+              <a:ext uri="{FF2B5EF4-FFF2-40B4-BE49-F238E27FC236}">
+                <a16:creationId xmlns:a16="http://schemas.microsoft.com/office/drawing/2014/main" id="{5AF3D0B8-5108-CFEB-CF0D-47165CAD314F}"/>
+              </a:ext>
+            </a:extLst>
+          </p:cNvPr>
+          <p:cNvSpPr>
+            <a:spLocks noGrp="1"/>
+          </p:cNvSpPr>
+          <p:nvPr>
+            <p:ph type="subTitle" idx="1"/>
+          </p:nvPr>
+        </p:nvSpPr>
+        <p:spPr>
+          <a:xfrm>
+            <a:off x="403412" y="1026084"/>
+            <a:ext cx="8387976" cy="3774649"/>
+          </a:xfrm>
+        </p:spPr>
+        <p:txBody>
+          <a:bodyPr/>
+          <a:lstStyle/>
+          <a:p>
+            <a:pPr marL="342900" indent="-342900" algn="l">
+              <a:buFont typeface="Arial" panose="020B0604020202020204" pitchFamily="34" charset="0"/>
+              <a:buChar char="•"/>
+            </a:pPr>
+            <a:endParaRPr lang="sv-SE" dirty="0"/>
+          </a:p>
+        </p:txBody>
+      </p:sp>
+      <p:pic>
+        <p:nvPicPr>
+          <p:cNvPr id="4" name="Picture 3">
+            <a:extLst>
+              <a:ext uri="{FF2B5EF4-FFF2-40B4-BE49-F238E27FC236}">
+                <a16:creationId xmlns:a16="http://schemas.microsoft.com/office/drawing/2014/main" id="{2F98D8AC-2AD5-76E8-68D7-59272CAD5F1E}"/>
+              </a:ext>
+            </a:extLst>
+          </p:cNvPr>
+          <p:cNvPicPr>
+            <a:picLocks noChangeAspect="1"/>
+          </p:cNvPicPr>
+          <p:nvPr/>
+        </p:nvPicPr>
+        <p:blipFill>
+          <a:blip r:embed="rId2"/>
+          <a:stretch>
+            <a:fillRect/>
+          </a:stretch>
+        </p:blipFill>
+        <p:spPr>
+          <a:xfrm>
+            <a:off x="4193302" y="2387146"/>
+            <a:ext cx="2768432" cy="1730270"/>
+          </a:xfrm>
+          <a:prstGeom prst="rect">
+            <a:avLst/>
+          </a:prstGeom>
+        </p:spPr>
+      </p:pic>
+    </p:spTree>
+    <p:extLst>
+      <p:ext uri="{BB962C8B-B14F-4D97-AF65-F5344CB8AC3E}">
+        <p14:creationId xmlns:p14="http://schemas.microsoft.com/office/powerpoint/2010/main" val="3297342631"/>
+      </p:ext>
+    </p:extLst>
+  </p:cSld>
+  <p:clrMapOvr>
+    <a:masterClrMapping/>
+  </p:clrMapOvr>
+</p:sld>
+</file>
+
+<file path=ppt/slides/slide12.xml><?xml version="1.0" encoding="utf-8"?>
+<p:sld xmlns:a="http://schemas.openxmlformats.org/drawingml/2006/main" xmlns:r="http://schemas.openxmlformats.org/officeDocument/2006/relationships" xmlns:p="http://schemas.openxmlformats.org/presentationml/2006/main">
+  <p:cSld>
+    <p:spTree>
+      <p:nvGrpSpPr>
+        <p:cNvPr id="1" name="">
+          <a:extLst>
+            <a:ext uri="{FF2B5EF4-FFF2-40B4-BE49-F238E27FC236}">
+              <a16:creationId xmlns:a16="http://schemas.microsoft.com/office/drawing/2014/main" id="{3BD350B3-6DF6-7FF9-7FDA-F1236B50A83C}"/>
+            </a:ext>
+          </a:extLst>
+        </p:cNvPr>
+        <p:cNvGrpSpPr/>
+        <p:nvPr/>
+      </p:nvGrpSpPr>
+      <p:grpSpPr>
+        <a:xfrm>
+          <a:off x="0" y="0"/>
+          <a:ext cx="0" cy="0"/>
+          <a:chOff x="0" y="0"/>
+          <a:chExt cx="0" cy="0"/>
+        </a:xfrm>
+      </p:grpSpPr>
+      <p:sp>
+        <p:nvSpPr>
+          <p:cNvPr id="2" name="Rubrik 1">
+            <a:extLst>
+              <a:ext uri="{FF2B5EF4-FFF2-40B4-BE49-F238E27FC236}">
+                <a16:creationId xmlns:a16="http://schemas.microsoft.com/office/drawing/2014/main" id="{8D09125A-D64C-70FB-4360-D15AF74A7F60}"/>
+              </a:ext>
+            </a:extLst>
+          </p:cNvPr>
+          <p:cNvSpPr>
+            <a:spLocks noGrp="1"/>
+          </p:cNvSpPr>
+          <p:nvPr>
+            <p:ph type="ctrTitle"/>
+          </p:nvPr>
+        </p:nvSpPr>
+        <p:spPr>
+          <a:xfrm>
+            <a:off x="267447" y="342766"/>
+            <a:ext cx="4017682" cy="631025"/>
+          </a:xfrm>
+        </p:spPr>
+        <p:txBody>
+          <a:bodyPr/>
+          <a:lstStyle/>
+          <a:p>
+            <a:r>
+              <a:rPr lang="sv-SE" dirty="0"/>
+              <a:t>5. </a:t>
+            </a:r>
+            <a:r>
+              <a:rPr lang="sv-SE" dirty="0" err="1"/>
+              <a:t>Conclusion</a:t>
+            </a:r>
+            <a:r>
+              <a:rPr lang="sv-SE" dirty="0"/>
+              <a:t> </a:t>
+            </a:r>
+          </a:p>
+        </p:txBody>
+      </p:sp>
+      <p:sp>
+        <p:nvSpPr>
+          <p:cNvPr id="3" name="Underrubrik 2">
+            <a:extLst>
+              <a:ext uri="{FF2B5EF4-FFF2-40B4-BE49-F238E27FC236}">
+                <a16:creationId xmlns:a16="http://schemas.microsoft.com/office/drawing/2014/main" id="{A80BA1C3-ABA1-BE19-3716-79A2C40D5758}"/>
+              </a:ext>
+            </a:extLst>
+          </p:cNvPr>
+          <p:cNvSpPr>
+            <a:spLocks noGrp="1"/>
+          </p:cNvSpPr>
+          <p:nvPr>
+            <p:ph type="subTitle" idx="1"/>
+          </p:nvPr>
+        </p:nvSpPr>
+        <p:spPr>
+          <a:xfrm>
+            <a:off x="403412" y="1026084"/>
+            <a:ext cx="8387976" cy="3774649"/>
+          </a:xfrm>
+        </p:spPr>
+        <p:txBody>
+          <a:bodyPr/>
+          <a:lstStyle/>
+          <a:p>
+            <a:pPr marL="342900" indent="-342900" algn="l">
+              <a:buFont typeface="Arial" panose="020B0604020202020204" pitchFamily="34" charset="0"/>
+              <a:buChar char="•"/>
+            </a:pPr>
+            <a:r>
+              <a:rPr lang="sv-SE" dirty="0"/>
+              <a:t>Saves </a:t>
+            </a:r>
+            <a:r>
+              <a:rPr lang="sv-SE" dirty="0" err="1"/>
+              <a:t>time</a:t>
+            </a:r>
+            <a:endParaRPr lang="sv-SE" dirty="0"/>
+          </a:p>
+          <a:p>
+            <a:pPr marL="342900" indent="-342900" algn="l">
+              <a:buFont typeface="Arial" panose="020B0604020202020204" pitchFamily="34" charset="0"/>
+              <a:buChar char="•"/>
+            </a:pPr>
+            <a:r>
+              <a:rPr lang="sv-SE" dirty="0" err="1"/>
+              <a:t>Etc</a:t>
+            </a:r>
+            <a:endParaRPr lang="sv-SE" dirty="0"/>
+          </a:p>
+          <a:p>
+            <a:pPr marL="342900" indent="-342900" algn="l">
+              <a:buFont typeface="Arial" panose="020B0604020202020204" pitchFamily="34" charset="0"/>
+              <a:buChar char="•"/>
+            </a:pPr>
+            <a:endParaRPr lang="sv-SE" dirty="0"/>
+          </a:p>
+        </p:txBody>
+      </p:sp>
+    </p:spTree>
+    <p:extLst>
+      <p:ext uri="{BB962C8B-B14F-4D97-AF65-F5344CB8AC3E}">
+        <p14:creationId xmlns:p14="http://schemas.microsoft.com/office/powerpoint/2010/main" val="3966850492"/>
+      </p:ext>
+    </p:extLst>
+  </p:cSld>
+  <p:clrMapOvr>
+    <a:masterClrMapping/>
+  </p:clrMapOvr>
+</p:sld>
+</file>
+
+<file path=ppt/slides/slide13.xml><?xml version="1.0" encoding="utf-8"?>
+<p:sld xmlns:a="http://schemas.openxmlformats.org/drawingml/2006/main" xmlns:r="http://schemas.openxmlformats.org/officeDocument/2006/relationships" xmlns:p="http://schemas.openxmlformats.org/presentationml/2006/main">
+  <p:cSld>
+    <p:spTree>
+      <p:nvGrpSpPr>
         <p:cNvPr id="1" name="">
           <a:extLst>
             <a:ext uri="{FF2B5EF4-FFF2-40B4-BE49-F238E27FC236}">
@@ -5381,7 +5744,7 @@
         <p:cNvPr id="1" name="">
           <a:extLst>
             <a:ext uri="{FF2B5EF4-FFF2-40B4-BE49-F238E27FC236}">
-              <a16:creationId xmlns:a16="http://schemas.microsoft.com/office/drawing/2014/main" id="{32460720-EE39-F9EB-7697-BEE80E15EF34}"/>
+              <a16:creationId xmlns:a16="http://schemas.microsoft.com/office/drawing/2014/main" id="{15702923-C079-BFA4-E419-AC9CD608D6F1}"/>
             </a:ext>
           </a:extLst>
         </p:cNvPr>
@@ -5398,120 +5761,68 @@
       </p:grpSpPr>
       <p:sp>
         <p:nvSpPr>
-          <p:cNvPr id="2" name="Rubrik 1">
-            <a:extLst>
-              <a:ext uri="{FF2B5EF4-FFF2-40B4-BE49-F238E27FC236}">
-                <a16:creationId xmlns:a16="http://schemas.microsoft.com/office/drawing/2014/main" id="{E2A13691-B2B0-9C30-7C84-1BFFCB746C88}"/>
-              </a:ext>
-            </a:extLst>
-          </p:cNvPr>
-          <p:cNvSpPr>
-            <a:spLocks noGrp="1"/>
-          </p:cNvSpPr>
-          <p:nvPr>
-            <p:ph type="ctrTitle"/>
-          </p:nvPr>
-        </p:nvSpPr>
-        <p:spPr>
-          <a:xfrm>
-            <a:off x="267447" y="342766"/>
-            <a:ext cx="4017682" cy="631025"/>
-          </a:xfrm>
-        </p:spPr>
+          <p:cNvPr id="2" name="Title 1">
+            <a:extLst>
+              <a:ext uri="{FF2B5EF4-FFF2-40B4-BE49-F238E27FC236}">
+                <a16:creationId xmlns:a16="http://schemas.microsoft.com/office/drawing/2014/main" id="{E2435AAA-C3D6-2369-585F-2858CB01BF36}"/>
+              </a:ext>
+            </a:extLst>
+          </p:cNvPr>
+          <p:cNvSpPr>
+            <a:spLocks noGrp="1"/>
+          </p:cNvSpPr>
+          <p:nvPr>
+            <p:ph type="title"/>
+          </p:nvPr>
+        </p:nvSpPr>
+        <p:spPr/>
         <p:txBody>
           <a:bodyPr/>
           <a:lstStyle/>
           <a:p>
             <a:r>
-              <a:rPr lang="sv-SE" dirty="0"/>
-              <a:t>3. </a:t>
-            </a:r>
-            <a:r>
-              <a:rPr lang="sv-SE" dirty="0" err="1"/>
-              <a:t>PhP</a:t>
-            </a:r>
-            <a:r>
-              <a:rPr lang="sv-SE" dirty="0"/>
-              <a:t> - </a:t>
-            </a:r>
-            <a:r>
-              <a:rPr lang="sv-SE" dirty="0" err="1"/>
-              <a:t>Laravel</a:t>
-            </a:r>
-            <a:endParaRPr lang="sv-SE" dirty="0"/>
-          </a:p>
-        </p:txBody>
-      </p:sp>
-      <p:sp>
-        <p:nvSpPr>
-          <p:cNvPr id="3" name="Underrubrik 2">
-            <a:extLst>
-              <a:ext uri="{FF2B5EF4-FFF2-40B4-BE49-F238E27FC236}">
-                <a16:creationId xmlns:a16="http://schemas.microsoft.com/office/drawing/2014/main" id="{79F619FE-B3E6-E398-2535-A52242FD41E9}"/>
-              </a:ext>
-            </a:extLst>
-          </p:cNvPr>
-          <p:cNvSpPr>
-            <a:spLocks noGrp="1"/>
-          </p:cNvSpPr>
-          <p:nvPr>
-            <p:ph type="subTitle" idx="1"/>
-          </p:nvPr>
-        </p:nvSpPr>
-        <p:spPr>
-          <a:xfrm>
-            <a:off x="403412" y="1026084"/>
-            <a:ext cx="8387976" cy="3774649"/>
-          </a:xfrm>
-        </p:spPr>
+              <a:rPr lang="en-FR" dirty="0"/>
+              <a:t>Data handling</a:t>
+            </a:r>
+          </a:p>
+        </p:txBody>
+      </p:sp>
+      <p:sp>
+        <p:nvSpPr>
+          <p:cNvPr id="3" name="Slide Number Placeholder 2">
+            <a:extLst>
+              <a:ext uri="{FF2B5EF4-FFF2-40B4-BE49-F238E27FC236}">
+                <a16:creationId xmlns:a16="http://schemas.microsoft.com/office/drawing/2014/main" id="{36519AE3-2DFB-DFD4-01FE-BF3BF5765F18}"/>
+              </a:ext>
+            </a:extLst>
+          </p:cNvPr>
+          <p:cNvSpPr>
+            <a:spLocks noGrp="1"/>
+          </p:cNvSpPr>
+          <p:nvPr>
+            <p:ph type="sldNum" sz="quarter" idx="4"/>
+          </p:nvPr>
+        </p:nvSpPr>
+        <p:spPr/>
         <p:txBody>
           <a:bodyPr/>
           <a:lstStyle/>
           <a:p>
-            <a:pPr marL="342900" indent="-342900" algn="l">
-              <a:buFont typeface="Arial" panose="020B0604020202020204" pitchFamily="34" charset="0"/>
-              <a:buChar char="•"/>
-            </a:pPr>
-            <a:r>
-              <a:rPr lang="en-US" dirty="0"/>
-              <a:t>What is Laravel?</a:t>
-            </a:r>
-          </a:p>
-          <a:p>
-            <a:pPr marL="342900" indent="-342900" algn="l">
-              <a:buFont typeface="Arial" panose="020B0604020202020204" pitchFamily="34" charset="0"/>
-              <a:buChar char="•"/>
-            </a:pPr>
-            <a:r>
-              <a:rPr lang="en-US" dirty="0"/>
-              <a:t>Different caching methods</a:t>
-            </a:r>
-          </a:p>
-          <a:p>
-            <a:pPr marL="342900" indent="-342900" algn="l">
-              <a:buFont typeface="Arial" panose="020B0604020202020204" pitchFamily="34" charset="0"/>
-              <a:buChar char="•"/>
-            </a:pPr>
-            <a:r>
-              <a:rPr lang="en-US" dirty="0"/>
-              <a:t>Code</a:t>
-            </a:r>
-          </a:p>
-          <a:p>
-            <a:pPr marL="342900" indent="-342900" algn="l">
-              <a:buFont typeface="Arial" panose="020B0604020202020204" pitchFamily="34" charset="0"/>
-              <a:buChar char="•"/>
-            </a:pPr>
+            <a:fld id="{610C4E4B-DC7F-8F40-B47C-DF522102C54B}" type="slidenum">
+              <a:rPr lang="sv-SE" smtClean="0"/>
+              <a:pPr/>
+              <a:t>5</a:t>
+            </a:fld>
             <a:endParaRPr lang="sv-SE" dirty="0"/>
           </a:p>
         </p:txBody>
       </p:sp>
       <p:pic>
         <p:nvPicPr>
-          <p:cNvPr id="4" name="Picture 3">
-            <a:extLst>
-              <a:ext uri="{FF2B5EF4-FFF2-40B4-BE49-F238E27FC236}">
-                <a16:creationId xmlns:a16="http://schemas.microsoft.com/office/drawing/2014/main" id="{D962001B-9A0B-DD22-AFDE-B1CD61530114}"/>
+          <p:cNvPr id="5" name="Picture 4">
+            <a:extLst>
+              <a:ext uri="{FF2B5EF4-FFF2-40B4-BE49-F238E27FC236}">
+                <a16:creationId xmlns:a16="http://schemas.microsoft.com/office/drawing/2014/main" id="{0F57F756-FFCF-EAEA-8534-570856E730F9}"/>
               </a:ext>
             </a:extLst>
           </p:cNvPr>
@@ -5528,8 +5839,8 @@
         </p:blipFill>
         <p:spPr>
           <a:xfrm>
-            <a:off x="2942986" y="2498312"/>
-            <a:ext cx="4947988" cy="1828605"/>
+            <a:off x="685800" y="1561921"/>
+            <a:ext cx="7772400" cy="2019657"/>
           </a:xfrm>
           <a:prstGeom prst="rect">
             <a:avLst/>
@@ -5539,7 +5850,7 @@
     </p:spTree>
     <p:extLst>
       <p:ext uri="{BB962C8B-B14F-4D97-AF65-F5344CB8AC3E}">
-        <p14:creationId xmlns:p14="http://schemas.microsoft.com/office/powerpoint/2010/main" val="3301784253"/>
+        <p14:creationId xmlns:p14="http://schemas.microsoft.com/office/powerpoint/2010/main" val="2146462148"/>
       </p:ext>
     </p:extLst>
   </p:cSld>
@@ -5568,10 +5879,38 @@
       </p:grpSpPr>
       <p:sp>
         <p:nvSpPr>
-          <p:cNvPr id="4" name="Slide Number Placeholder 3">
-            <a:extLst>
-              <a:ext uri="{FF2B5EF4-FFF2-40B4-BE49-F238E27FC236}">
-                <a16:creationId xmlns:a16="http://schemas.microsoft.com/office/drawing/2014/main" id="{58001061-C3D2-D908-5577-0B23761AE2A9}"/>
+          <p:cNvPr id="2" name="Title 1">
+            <a:extLst>
+              <a:ext uri="{FF2B5EF4-FFF2-40B4-BE49-F238E27FC236}">
+                <a16:creationId xmlns:a16="http://schemas.microsoft.com/office/drawing/2014/main" id="{55C34423-6792-62ED-E962-CBAF1F3C10E4}"/>
+              </a:ext>
+            </a:extLst>
+          </p:cNvPr>
+          <p:cNvSpPr>
+            <a:spLocks noGrp="1"/>
+          </p:cNvSpPr>
+          <p:nvPr>
+            <p:ph type="title"/>
+          </p:nvPr>
+        </p:nvSpPr>
+        <p:spPr/>
+        <p:txBody>
+          <a:bodyPr/>
+          <a:lstStyle/>
+          <a:p>
+            <a:r>
+              <a:rPr lang="en-FR" dirty="0"/>
+              <a:t>Practical and scalable usage</a:t>
+            </a:r>
+          </a:p>
+        </p:txBody>
+      </p:sp>
+      <p:sp>
+        <p:nvSpPr>
+          <p:cNvPr id="3" name="Slide Number Placeholder 2">
+            <a:extLst>
+              <a:ext uri="{FF2B5EF4-FFF2-40B4-BE49-F238E27FC236}">
+                <a16:creationId xmlns:a16="http://schemas.microsoft.com/office/drawing/2014/main" id="{C238BE4A-783E-C722-9667-EF8D12BDC35A}"/>
               </a:ext>
             </a:extLst>
           </p:cNvPr>
@@ -5598,10 +5937,10 @@
       </p:sp>
       <p:pic>
         <p:nvPicPr>
-          <p:cNvPr id="6" name="Picture 5" descr="A close-up of a computer screen&#10;&#10;Description automatically generated">
-            <a:extLst>
-              <a:ext uri="{FF2B5EF4-FFF2-40B4-BE49-F238E27FC236}">
-                <a16:creationId xmlns:a16="http://schemas.microsoft.com/office/drawing/2014/main" id="{B0889138-7A10-C9CF-2F43-18C0FC93CF1A}"/>
+          <p:cNvPr id="4" name="Picture 3">
+            <a:extLst>
+              <a:ext uri="{FF2B5EF4-FFF2-40B4-BE49-F238E27FC236}">
+                <a16:creationId xmlns:a16="http://schemas.microsoft.com/office/drawing/2014/main" id="{6F20487A-D6EF-D663-1954-EB397D3BF643}"/>
               </a:ext>
             </a:extLst>
           </p:cNvPr>
@@ -5618,38 +5957,8 @@
         </p:blipFill>
         <p:spPr>
           <a:xfrm>
-            <a:off x="270060" y="258109"/>
-            <a:ext cx="7666495" cy="1317930"/>
-          </a:xfrm>
-          <a:prstGeom prst="rect">
-            <a:avLst/>
-          </a:prstGeom>
-        </p:spPr>
-      </p:pic>
-      <p:pic>
-        <p:nvPicPr>
-          <p:cNvPr id="8" name="Picture 7" descr="A computer screen shot of a program code&#10;&#10;Description automatically generated">
-            <a:extLst>
-              <a:ext uri="{FF2B5EF4-FFF2-40B4-BE49-F238E27FC236}">
-                <a16:creationId xmlns:a16="http://schemas.microsoft.com/office/drawing/2014/main" id="{2AA7DF8F-6BB0-705C-8DEF-15882DB88BE3}"/>
-              </a:ext>
-            </a:extLst>
-          </p:cNvPr>
-          <p:cNvPicPr>
-            <a:picLocks noChangeAspect="1"/>
-          </p:cNvPicPr>
-          <p:nvPr/>
-        </p:nvPicPr>
-        <p:blipFill>
-          <a:blip r:embed="rId3"/>
-          <a:stretch>
-            <a:fillRect/>
-          </a:stretch>
-        </p:blipFill>
-        <p:spPr>
-          <a:xfrm>
-            <a:off x="270061" y="1886805"/>
-            <a:ext cx="5166191" cy="2625721"/>
+            <a:off x="685800" y="1279880"/>
+            <a:ext cx="7772400" cy="2583740"/>
           </a:xfrm>
           <a:prstGeom prst="rect">
             <a:avLst/>
@@ -5659,7 +5968,7 @@
     </p:spTree>
     <p:extLst>
       <p:ext uri="{BB962C8B-B14F-4D97-AF65-F5344CB8AC3E}">
-        <p14:creationId xmlns:p14="http://schemas.microsoft.com/office/powerpoint/2010/main" val="3026030767"/>
+        <p14:creationId xmlns:p14="http://schemas.microsoft.com/office/powerpoint/2010/main" val="1063189577"/>
       </p:ext>
     </p:extLst>
   </p:cSld>
@@ -5674,7 +5983,13 @@
   <p:cSld>
     <p:spTree>
       <p:nvGrpSpPr>
-        <p:cNvPr id="1" name=""/>
+        <p:cNvPr id="1" name="">
+          <a:extLst>
+            <a:ext uri="{FF2B5EF4-FFF2-40B4-BE49-F238E27FC236}">
+              <a16:creationId xmlns:a16="http://schemas.microsoft.com/office/drawing/2014/main" id="{18A2A4E8-73A9-16BB-267E-E275A731AFE4}"/>
+            </a:ext>
+          </a:extLst>
+        </p:cNvPr>
         <p:cNvGrpSpPr/>
         <p:nvPr/>
       </p:nvGrpSpPr>
@@ -5688,10 +6003,38 @@
       </p:grpSpPr>
       <p:sp>
         <p:nvSpPr>
-          <p:cNvPr id="4" name="Slide Number Placeholder 3">
-            <a:extLst>
-              <a:ext uri="{FF2B5EF4-FFF2-40B4-BE49-F238E27FC236}">
-                <a16:creationId xmlns:a16="http://schemas.microsoft.com/office/drawing/2014/main" id="{1C34CFB4-E244-A565-272C-28076862287A}"/>
+          <p:cNvPr id="2" name="Title 1">
+            <a:extLst>
+              <a:ext uri="{FF2B5EF4-FFF2-40B4-BE49-F238E27FC236}">
+                <a16:creationId xmlns:a16="http://schemas.microsoft.com/office/drawing/2014/main" id="{4C25193D-2558-A49B-5753-EA2224DC7008}"/>
+              </a:ext>
+            </a:extLst>
+          </p:cNvPr>
+          <p:cNvSpPr>
+            <a:spLocks noGrp="1"/>
+          </p:cNvSpPr>
+          <p:nvPr>
+            <p:ph type="title"/>
+          </p:nvPr>
+        </p:nvSpPr>
+        <p:spPr/>
+        <p:txBody>
+          <a:bodyPr/>
+          <a:lstStyle/>
+          <a:p>
+            <a:r>
+              <a:rPr lang="en-FR" dirty="0"/>
+              <a:t>Speed Comparision</a:t>
+            </a:r>
+          </a:p>
+        </p:txBody>
+      </p:sp>
+      <p:sp>
+        <p:nvSpPr>
+          <p:cNvPr id="3" name="Slide Number Placeholder 2">
+            <a:extLst>
+              <a:ext uri="{FF2B5EF4-FFF2-40B4-BE49-F238E27FC236}">
+                <a16:creationId xmlns:a16="http://schemas.microsoft.com/office/drawing/2014/main" id="{E9DDF36D-C190-BC6B-EE66-B1C93B134B24}"/>
               </a:ext>
             </a:extLst>
           </p:cNvPr>
@@ -5718,10 +6061,10 @@
       </p:sp>
       <p:pic>
         <p:nvPicPr>
-          <p:cNvPr id="6" name="Picture 5" descr="A screenshot of a computer program&#10;&#10;Description automatically generated">
-            <a:extLst>
-              <a:ext uri="{FF2B5EF4-FFF2-40B4-BE49-F238E27FC236}">
-                <a16:creationId xmlns:a16="http://schemas.microsoft.com/office/drawing/2014/main" id="{99C2D10F-91A8-7556-F5D7-5641C63B6793}"/>
+          <p:cNvPr id="7" name="Picture 6" descr="A screenshot of a computer program&#10;&#10;Description automatically generated">
+            <a:extLst>
+              <a:ext uri="{FF2B5EF4-FFF2-40B4-BE49-F238E27FC236}">
+                <a16:creationId xmlns:a16="http://schemas.microsoft.com/office/drawing/2014/main" id="{7F0A935A-6A27-4E91-6712-34D2AB5CAC55}"/>
               </a:ext>
             </a:extLst>
           </p:cNvPr>
@@ -5738,8 +6081,8 @@
         </p:blipFill>
         <p:spPr>
           <a:xfrm>
-            <a:off x="184770" y="269488"/>
-            <a:ext cx="6502632" cy="4480932"/>
+            <a:off x="540000" y="1315189"/>
+            <a:ext cx="6883400" cy="3022600"/>
           </a:xfrm>
           <a:prstGeom prst="rect">
             <a:avLst/>
@@ -5749,7 +6092,7 @@
     </p:spTree>
     <p:extLst>
       <p:ext uri="{BB962C8B-B14F-4D97-AF65-F5344CB8AC3E}">
-        <p14:creationId xmlns:p14="http://schemas.microsoft.com/office/powerpoint/2010/main" val="1247306074"/>
+        <p14:creationId xmlns:p14="http://schemas.microsoft.com/office/powerpoint/2010/main" val="600152240"/>
       </p:ext>
     </p:extLst>
   </p:cSld>
@@ -5767,7 +6110,7 @@
         <p:cNvPr id="1" name="">
           <a:extLst>
             <a:ext uri="{FF2B5EF4-FFF2-40B4-BE49-F238E27FC236}">
-              <a16:creationId xmlns:a16="http://schemas.microsoft.com/office/drawing/2014/main" id="{9A2D378D-9D94-F325-C647-A3C8C043D55B}"/>
+              <a16:creationId xmlns:a16="http://schemas.microsoft.com/office/drawing/2014/main" id="{32460720-EE39-F9EB-7697-BEE80E15EF34}"/>
             </a:ext>
           </a:extLst>
         </p:cNvPr>
@@ -5787,7 +6130,7 @@
           <p:cNvPr id="2" name="Rubrik 1">
             <a:extLst>
               <a:ext uri="{FF2B5EF4-FFF2-40B4-BE49-F238E27FC236}">
-                <a16:creationId xmlns:a16="http://schemas.microsoft.com/office/drawing/2014/main" id="{7B8832C8-A86B-1438-6DD5-898CBCB0DBE4}"/>
+                <a16:creationId xmlns:a16="http://schemas.microsoft.com/office/drawing/2014/main" id="{E2A13691-B2B0-9C30-7C84-1BFFCB746C88}"/>
               </a:ext>
             </a:extLst>
           </p:cNvPr>
@@ -5810,8 +6153,21 @@
           <a:p>
             <a:r>
               <a:rPr lang="sv-SE" dirty="0"/>
-              <a:t>4. Java</a:t>
-            </a:r>
+              <a:t>3. </a:t>
+            </a:r>
+            <a:r>
+              <a:rPr lang="sv-SE" dirty="0" err="1"/>
+              <a:t>PhP</a:t>
+            </a:r>
+            <a:r>
+              <a:rPr lang="sv-SE" dirty="0"/>
+              <a:t> - </a:t>
+            </a:r>
+            <a:r>
+              <a:rPr lang="sv-SE" dirty="0" err="1"/>
+              <a:t>Laravel</a:t>
+            </a:r>
+            <a:endParaRPr lang="sv-SE" dirty="0"/>
           </a:p>
         </p:txBody>
       </p:sp>
@@ -5820,7 +6176,7 @@
           <p:cNvPr id="3" name="Underrubrik 2">
             <a:extLst>
               <a:ext uri="{FF2B5EF4-FFF2-40B4-BE49-F238E27FC236}">
-                <a16:creationId xmlns:a16="http://schemas.microsoft.com/office/drawing/2014/main" id="{5AF3D0B8-5108-CFEB-CF0D-47165CAD314F}"/>
+                <a16:creationId xmlns:a16="http://schemas.microsoft.com/office/drawing/2014/main" id="{79F619FE-B3E6-E398-2535-A52242FD41E9}"/>
               </a:ext>
             </a:extLst>
           </p:cNvPr>
@@ -5840,6 +6196,36 @@
         <p:txBody>
           <a:bodyPr/>
           <a:lstStyle/>
+          <a:p>
+            <a:pPr marL="342900" indent="-342900" algn="l">
+              <a:buFont typeface="Arial" panose="020B0604020202020204" pitchFamily="34" charset="0"/>
+              <a:buChar char="•"/>
+            </a:pPr>
+            <a:r>
+              <a:rPr lang="en-US" dirty="0"/>
+              <a:t>What is Laravel?</a:t>
+            </a:r>
+          </a:p>
+          <a:p>
+            <a:pPr marL="342900" indent="-342900" algn="l">
+              <a:buFont typeface="Arial" panose="020B0604020202020204" pitchFamily="34" charset="0"/>
+              <a:buChar char="•"/>
+            </a:pPr>
+            <a:r>
+              <a:rPr lang="en-US" dirty="0"/>
+              <a:t>Different caching methods</a:t>
+            </a:r>
+          </a:p>
+          <a:p>
+            <a:pPr marL="342900" indent="-342900" algn="l">
+              <a:buFont typeface="Arial" panose="020B0604020202020204" pitchFamily="34" charset="0"/>
+              <a:buChar char="•"/>
+            </a:pPr>
+            <a:r>
+              <a:rPr lang="en-US" dirty="0"/>
+              <a:t>Code</a:t>
+            </a:r>
+          </a:p>
           <a:p>
             <a:pPr marL="342900" indent="-342900" algn="l">
               <a:buFont typeface="Arial" panose="020B0604020202020204" pitchFamily="34" charset="0"/>
@@ -5854,7 +6240,7 @@
           <p:cNvPr id="4" name="Picture 3">
             <a:extLst>
               <a:ext uri="{FF2B5EF4-FFF2-40B4-BE49-F238E27FC236}">
-                <a16:creationId xmlns:a16="http://schemas.microsoft.com/office/drawing/2014/main" id="{2F98D8AC-2AD5-76E8-68D7-59272CAD5F1E}"/>
+                <a16:creationId xmlns:a16="http://schemas.microsoft.com/office/drawing/2014/main" id="{D962001B-9A0B-DD22-AFDE-B1CD61530114}"/>
               </a:ext>
             </a:extLst>
           </p:cNvPr>
@@ -5871,8 +6257,8 @@
         </p:blipFill>
         <p:spPr>
           <a:xfrm>
-            <a:off x="4193302" y="2387146"/>
-            <a:ext cx="2768432" cy="1730270"/>
+            <a:off x="2942986" y="2498312"/>
+            <a:ext cx="4947988" cy="1828605"/>
           </a:xfrm>
           <a:prstGeom prst="rect">
             <a:avLst/>
@@ -5882,7 +6268,7 @@
     </p:spTree>
     <p:extLst>
       <p:ext uri="{BB962C8B-B14F-4D97-AF65-F5344CB8AC3E}">
-        <p14:creationId xmlns:p14="http://schemas.microsoft.com/office/powerpoint/2010/main" val="3297342631"/>
+        <p14:creationId xmlns:p14="http://schemas.microsoft.com/office/powerpoint/2010/main" val="3301784253"/>
       </p:ext>
     </p:extLst>
   </p:cSld>
@@ -5897,13 +6283,7 @@
   <p:cSld>
     <p:spTree>
       <p:nvGrpSpPr>
-        <p:cNvPr id="1" name="">
-          <a:extLst>
-            <a:ext uri="{FF2B5EF4-FFF2-40B4-BE49-F238E27FC236}">
-              <a16:creationId xmlns:a16="http://schemas.microsoft.com/office/drawing/2014/main" id="{3BD350B3-6DF6-7FF9-7FDA-F1236B50A83C}"/>
-            </a:ext>
-          </a:extLst>
-        </p:cNvPr>
+        <p:cNvPr id="1" name=""/>
         <p:cNvGrpSpPr/>
         <p:nvPr/>
       </p:nvGrpSpPr>
@@ -5917,109 +6297,98 @@
       </p:grpSpPr>
       <p:sp>
         <p:nvSpPr>
-          <p:cNvPr id="2" name="Rubrik 1">
-            <a:extLst>
-              <a:ext uri="{FF2B5EF4-FFF2-40B4-BE49-F238E27FC236}">
-                <a16:creationId xmlns:a16="http://schemas.microsoft.com/office/drawing/2014/main" id="{8D09125A-D64C-70FB-4360-D15AF74A7F60}"/>
-              </a:ext>
-            </a:extLst>
-          </p:cNvPr>
-          <p:cNvSpPr>
-            <a:spLocks noGrp="1"/>
-          </p:cNvSpPr>
-          <p:nvPr>
-            <p:ph type="ctrTitle"/>
-          </p:nvPr>
-        </p:nvSpPr>
-        <p:spPr>
-          <a:xfrm>
-            <a:off x="267447" y="342766"/>
-            <a:ext cx="4017682" cy="631025"/>
-          </a:xfrm>
-        </p:spPr>
+          <p:cNvPr id="4" name="Slide Number Placeholder 3">
+            <a:extLst>
+              <a:ext uri="{FF2B5EF4-FFF2-40B4-BE49-F238E27FC236}">
+                <a16:creationId xmlns:a16="http://schemas.microsoft.com/office/drawing/2014/main" id="{58001061-C3D2-D908-5577-0B23761AE2A9}"/>
+              </a:ext>
+            </a:extLst>
+          </p:cNvPr>
+          <p:cNvSpPr>
+            <a:spLocks noGrp="1"/>
+          </p:cNvSpPr>
+          <p:nvPr>
+            <p:ph type="sldNum" sz="quarter" idx="4"/>
+          </p:nvPr>
+        </p:nvSpPr>
+        <p:spPr/>
         <p:txBody>
           <a:bodyPr/>
           <a:lstStyle/>
           <a:p>
-            <a:r>
-              <a:rPr lang="sv-SE" dirty="0"/>
-              <a:t>5. </a:t>
-            </a:r>
-            <a:r>
-              <a:rPr lang="sv-SE" dirty="0" err="1"/>
-              <a:t>Conclusion</a:t>
-            </a:r>
-            <a:r>
-              <a:rPr lang="sv-SE" dirty="0"/>
-              <a:t> </a:t>
-            </a:r>
-          </a:p>
-        </p:txBody>
-      </p:sp>
-      <p:sp>
-        <p:nvSpPr>
-          <p:cNvPr id="3" name="Underrubrik 2">
-            <a:extLst>
-              <a:ext uri="{FF2B5EF4-FFF2-40B4-BE49-F238E27FC236}">
-                <a16:creationId xmlns:a16="http://schemas.microsoft.com/office/drawing/2014/main" id="{A80BA1C3-ABA1-BE19-3716-79A2C40D5758}"/>
-              </a:ext>
-            </a:extLst>
-          </p:cNvPr>
-          <p:cNvSpPr>
-            <a:spLocks noGrp="1"/>
-          </p:cNvSpPr>
-          <p:nvPr>
-            <p:ph type="subTitle" idx="1"/>
-          </p:nvPr>
-        </p:nvSpPr>
-        <p:spPr>
-          <a:xfrm>
-            <a:off x="403412" y="1026084"/>
-            <a:ext cx="8387976" cy="3774649"/>
-          </a:xfrm>
-        </p:spPr>
-        <p:txBody>
-          <a:bodyPr/>
-          <a:lstStyle/>
-          <a:p>
-            <a:pPr marL="342900" indent="-342900" algn="l">
-              <a:buFont typeface="Arial" panose="020B0604020202020204" pitchFamily="34" charset="0"/>
-              <a:buChar char="•"/>
-            </a:pPr>
-            <a:r>
-              <a:rPr lang="sv-SE" dirty="0"/>
-              <a:t>Saves </a:t>
-            </a:r>
-            <a:r>
-              <a:rPr lang="sv-SE" dirty="0" err="1"/>
-              <a:t>time</a:t>
-            </a:r>
+            <a:fld id="{610C4E4B-DC7F-8F40-B47C-DF522102C54B}" type="slidenum">
+              <a:rPr lang="sv-SE" smtClean="0"/>
+              <a:pPr/>
+              <a:t>9</a:t>
+            </a:fld>
             <a:endParaRPr lang="sv-SE" dirty="0"/>
           </a:p>
-          <a:p>
-            <a:pPr marL="342900" indent="-342900" algn="l">
-              <a:buFont typeface="Arial" panose="020B0604020202020204" pitchFamily="34" charset="0"/>
-              <a:buChar char="•"/>
-            </a:pPr>
-            <a:r>
-              <a:rPr lang="sv-SE" dirty="0" err="1"/>
-              <a:t>Etc</a:t>
-            </a:r>
-            <a:endParaRPr lang="sv-SE" dirty="0"/>
-          </a:p>
-          <a:p>
-            <a:pPr marL="342900" indent="-342900" algn="l">
-              <a:buFont typeface="Arial" panose="020B0604020202020204" pitchFamily="34" charset="0"/>
-              <a:buChar char="•"/>
-            </a:pPr>
-            <a:endParaRPr lang="sv-SE" dirty="0"/>
-          </a:p>
-        </p:txBody>
-      </p:sp>
+        </p:txBody>
+      </p:sp>
+      <p:pic>
+        <p:nvPicPr>
+          <p:cNvPr id="6" name="Picture 5" descr="A close-up of a computer screen&#10;&#10;Description automatically generated">
+            <a:extLst>
+              <a:ext uri="{FF2B5EF4-FFF2-40B4-BE49-F238E27FC236}">
+                <a16:creationId xmlns:a16="http://schemas.microsoft.com/office/drawing/2014/main" id="{B0889138-7A10-C9CF-2F43-18C0FC93CF1A}"/>
+              </a:ext>
+            </a:extLst>
+          </p:cNvPr>
+          <p:cNvPicPr>
+            <a:picLocks noChangeAspect="1"/>
+          </p:cNvPicPr>
+          <p:nvPr/>
+        </p:nvPicPr>
+        <p:blipFill>
+          <a:blip r:embed="rId2"/>
+          <a:stretch>
+            <a:fillRect/>
+          </a:stretch>
+        </p:blipFill>
+        <p:spPr>
+          <a:xfrm>
+            <a:off x="270060" y="258109"/>
+            <a:ext cx="7666495" cy="1317930"/>
+          </a:xfrm>
+          <a:prstGeom prst="rect">
+            <a:avLst/>
+          </a:prstGeom>
+        </p:spPr>
+      </p:pic>
+      <p:pic>
+        <p:nvPicPr>
+          <p:cNvPr id="8" name="Picture 7" descr="A computer screen shot of a program code&#10;&#10;Description automatically generated">
+            <a:extLst>
+              <a:ext uri="{FF2B5EF4-FFF2-40B4-BE49-F238E27FC236}">
+                <a16:creationId xmlns:a16="http://schemas.microsoft.com/office/drawing/2014/main" id="{2AA7DF8F-6BB0-705C-8DEF-15882DB88BE3}"/>
+              </a:ext>
+            </a:extLst>
+          </p:cNvPr>
+          <p:cNvPicPr>
+            <a:picLocks noChangeAspect="1"/>
+          </p:cNvPicPr>
+          <p:nvPr/>
+        </p:nvPicPr>
+        <p:blipFill>
+          <a:blip r:embed="rId3"/>
+          <a:stretch>
+            <a:fillRect/>
+          </a:stretch>
+        </p:blipFill>
+        <p:spPr>
+          <a:xfrm>
+            <a:off x="270061" y="1886805"/>
+            <a:ext cx="5166191" cy="2625721"/>
+          </a:xfrm>
+          <a:prstGeom prst="rect">
+            <a:avLst/>
+          </a:prstGeom>
+        </p:spPr>
+      </p:pic>
     </p:spTree>
     <p:extLst>
       <p:ext uri="{BB962C8B-B14F-4D97-AF65-F5344CB8AC3E}">
-        <p14:creationId xmlns:p14="http://schemas.microsoft.com/office/powerpoint/2010/main" val="3966850492"/>
+        <p14:creationId xmlns:p14="http://schemas.microsoft.com/office/powerpoint/2010/main" val="3026030767"/>
       </p:ext>
     </p:extLst>
   </p:cSld>
@@ -6991,6 +7360,18 @@
 </file>
 
 <file path=customXml/item1.xml><?xml version="1.0" encoding="utf-8"?>
+<p:properties xmlns:p="http://schemas.microsoft.com/office/2006/metadata/properties" xmlns:xsi="http://www.w3.org/2001/XMLSchema-instance" xmlns:pc="http://schemas.microsoft.com/office/infopath/2007/PartnerControls">
+  <documentManagement>
+    <lcf76f155ced4ddcb4097134ff3c332f xmlns="a27dfd0f-a6f2-4712-9137-d9a404cddc60">
+      <Terms xmlns="http://schemas.microsoft.com/office/infopath/2007/PartnerControls"/>
+    </lcf76f155ced4ddcb4097134ff3c332f>
+    <Datum xmlns="a27dfd0f-a6f2-4712-9137-d9a404cddc60">2019-01-08T01:00:00+00:00</Datum>
+    <TaxCatchAll xmlns="661728cc-f8de-4546-bc23-5f5fdbb4708e" xsi:nil="true"/>
+  </documentManagement>
+</p:properties>
+</file>
+
+<file path=customXml/item2.xml><?xml version="1.0" encoding="utf-8"?>
 <ct:contentTypeSchema xmlns:ct="http://schemas.microsoft.com/office/2006/metadata/contentType" xmlns:ma="http://schemas.microsoft.com/office/2006/metadata/properties/metaAttributes" ct:_="" ma:_="" ma:contentTypeName="dokument" ma:contentTypeID="0x010100830AFD53EA4FAC4B93D1BAD879B4B205" ma:contentTypeVersion="20" ma:contentTypeDescription="Skapa ett nytt dokument." ma:contentTypeScope="" ma:versionID="d20458860b4e67c8a989bb88ba1189b9">
   <xsd:schema xmlns:xsd="http://www.w3.org/2001/XMLSchema" xmlns:xs="http://www.w3.org/2001/XMLSchema" xmlns:p="http://schemas.microsoft.com/office/2006/metadata/properties" xmlns:ns2="a27dfd0f-a6f2-4712-9137-d9a404cddc60" xmlns:ns3="661728cc-f8de-4546-bc23-5f5fdbb4708e" targetNamespace="http://schemas.microsoft.com/office/2006/metadata/properties" ma:root="true" ma:fieldsID="704e11bb582ec7a1851f532e774c0983" ns2:_="" ns3:_="">
     <xsd:import namespace="a27dfd0f-a6f2-4712-9137-d9a404cddc60"/>
@@ -7211,18 +7592,6 @@
 </ct:contentTypeSchema>
 </file>
 
-<file path=customXml/item2.xml><?xml version="1.0" encoding="utf-8"?>
-<p:properties xmlns:p="http://schemas.microsoft.com/office/2006/metadata/properties" xmlns:xsi="http://www.w3.org/2001/XMLSchema-instance" xmlns:pc="http://schemas.microsoft.com/office/infopath/2007/PartnerControls">
-  <documentManagement>
-    <lcf76f155ced4ddcb4097134ff3c332f xmlns="a27dfd0f-a6f2-4712-9137-d9a404cddc60">
-      <Terms xmlns="http://schemas.microsoft.com/office/infopath/2007/PartnerControls"/>
-    </lcf76f155ced4ddcb4097134ff3c332f>
-    <Datum xmlns="a27dfd0f-a6f2-4712-9137-d9a404cddc60">2019-01-08T01:00:00+00:00</Datum>
-    <TaxCatchAll xmlns="661728cc-f8de-4546-bc23-5f5fdbb4708e" xsi:nil="true"/>
-  </documentManagement>
-</p:properties>
-</file>
-
 <file path=customXml/item3.xml><?xml version="1.0" encoding="utf-8"?>
 <?mso-contentType ?>
 <FormTemplates xmlns="http://schemas.microsoft.com/sharepoint/v3/contenttype/forms">
@@ -7233,6 +7602,17 @@
 </file>
 
 <file path=customXml/itemProps1.xml><?xml version="1.0" encoding="utf-8"?>
+<ds:datastoreItem xmlns:ds="http://schemas.openxmlformats.org/officeDocument/2006/customXml" ds:itemID="{0CF91B3D-EC90-430A-AB1E-F0238E505E8F}">
+  <ds:schemaRefs>
+    <ds:schemaRef ds:uri="http://schemas.microsoft.com/office/2006/metadata/properties"/>
+    <ds:schemaRef ds:uri="http://schemas.microsoft.com/office/infopath/2007/PartnerControls"/>
+    <ds:schemaRef ds:uri="a27dfd0f-a6f2-4712-9137-d9a404cddc60"/>
+    <ds:schemaRef ds:uri="661728cc-f8de-4546-bc23-5f5fdbb4708e"/>
+  </ds:schemaRefs>
+</ds:datastoreItem>
+</file>
+
+<file path=customXml/itemProps2.xml><?xml version="1.0" encoding="utf-8"?>
 <ds:datastoreItem xmlns:ds="http://schemas.openxmlformats.org/officeDocument/2006/customXml" ds:itemID="{4DA24E85-69A4-40E6-B457-5DEA4943BCC4}">
   <ds:schemaRefs>
     <ds:schemaRef ds:uri="http://schemas.microsoft.com/office/2006/metadata/contentType"/>
@@ -7251,17 +7631,6 @@
 </ds:datastoreItem>
 </file>
 
-<file path=customXml/itemProps2.xml><?xml version="1.0" encoding="utf-8"?>
-<ds:datastoreItem xmlns:ds="http://schemas.openxmlformats.org/officeDocument/2006/customXml" ds:itemID="{0CF91B3D-EC90-430A-AB1E-F0238E505E8F}">
-  <ds:schemaRefs>
-    <ds:schemaRef ds:uri="http://schemas.microsoft.com/office/2006/metadata/properties"/>
-    <ds:schemaRef ds:uri="http://schemas.microsoft.com/office/infopath/2007/PartnerControls"/>
-    <ds:schemaRef ds:uri="a27dfd0f-a6f2-4712-9137-d9a404cddc60"/>
-    <ds:schemaRef ds:uri="661728cc-f8de-4546-bc23-5f5fdbb4708e"/>
-  </ds:schemaRefs>
-</ds:datastoreItem>
-</file>
-
 <file path=customXml/itemProps3.xml><?xml version="1.0" encoding="utf-8"?>
 <ds:datastoreItem xmlns:ds="http://schemas.openxmlformats.org/officeDocument/2006/customXml" ds:itemID="{D28E330F-FAEB-43BD-88E9-B921C1D5AE7B}">
   <ds:schemaRefs>

</xml_diff>

<commit_message>
PPT update and got my files back
</commit_message>
<xml_diff>
--- a/Groupwork ppt.pptx
+++ b/Groupwork ppt.pptx
@@ -5,10 +5,10 @@
     <p:sldMasterId id="2147483648" r:id="rId4"/>
   </p:sldMasterIdLst>
   <p:notesMasterIdLst>
-    <p:notesMasterId r:id="rId24"/>
+    <p:notesMasterId r:id="rId30"/>
   </p:notesMasterIdLst>
   <p:handoutMasterIdLst>
-    <p:handoutMasterId r:id="rId25"/>
+    <p:handoutMasterId r:id="rId31"/>
   </p:handoutMasterIdLst>
   <p:sldIdLst>
     <p:sldId id="419" r:id="rId5"/>
@@ -20,16 +20,22 @@
     <p:sldId id="430" r:id="rId11"/>
     <p:sldId id="441" r:id="rId12"/>
     <p:sldId id="423" r:id="rId13"/>
-    <p:sldId id="424" r:id="rId14"/>
-    <p:sldId id="425" r:id="rId15"/>
-    <p:sldId id="426" r:id="rId16"/>
-    <p:sldId id="432" r:id="rId17"/>
-    <p:sldId id="433" r:id="rId18"/>
-    <p:sldId id="437" r:id="rId19"/>
-    <p:sldId id="438" r:id="rId20"/>
-    <p:sldId id="439" r:id="rId21"/>
-    <p:sldId id="427" r:id="rId22"/>
-    <p:sldId id="428" r:id="rId23"/>
+    <p:sldId id="442" r:id="rId14"/>
+    <p:sldId id="443" r:id="rId15"/>
+    <p:sldId id="444" r:id="rId16"/>
+    <p:sldId id="446" r:id="rId17"/>
+    <p:sldId id="445" r:id="rId18"/>
+    <p:sldId id="425" r:id="rId19"/>
+    <p:sldId id="447" r:id="rId20"/>
+    <p:sldId id="426" r:id="rId21"/>
+    <p:sldId id="432" r:id="rId22"/>
+    <p:sldId id="433" r:id="rId23"/>
+    <p:sldId id="437" r:id="rId24"/>
+    <p:sldId id="438" r:id="rId25"/>
+    <p:sldId id="439" r:id="rId26"/>
+    <p:sldId id="427" r:id="rId27"/>
+    <p:sldId id="428" r:id="rId28"/>
+    <p:sldId id="448" r:id="rId29"/>
   </p:sldIdLst>
   <p:sldSz cx="9144000" cy="5143500" type="screen16x9"/>
   <p:notesSz cx="6784975" cy="9906000"/>
@@ -4198,14 +4204,14 @@
           </a:ln>
           <a:extLst>
             <a:ext uri="{909E8E84-426E-40dd-AFC4-6F175D3DCCD1}">
-              <a14:hiddenFill xmlns:a14="http://schemas.microsoft.com/office/drawing/2010/main" xmlns="">
+              <a14:hiddenFill xmlns="" xmlns:a14="http://schemas.microsoft.com/office/drawing/2010/main">
                 <a:solidFill>
                   <a:srgbClr val="FFFFFF"/>
                 </a:solidFill>
               </a14:hiddenFill>
             </a:ext>
             <a:ext uri="{91240B29-F687-4f45-9708-019B960494DF}">
-              <a14:hiddenLine xmlns:a14="http://schemas.microsoft.com/office/drawing/2010/main" xmlns="" w="9525">
+              <a14:hiddenLine xmlns="" xmlns:a14="http://schemas.microsoft.com/office/drawing/2010/main" w="9525">
                 <a:solidFill>
                   <a:srgbClr val="000000"/>
                 </a:solidFill>
@@ -4215,7 +4221,7 @@
               </a14:hiddenLine>
             </a:ext>
             <a:ext uri="{FAA26D3D-D897-4be2-8F04-BA451C77F1D7}">
-              <ma14:placeholderFlag xmlns:ma14="http://schemas.microsoft.com/office/mac/drawingml/2011/main" xmlns="" val="1"/>
+              <ma14:placeholderFlag xmlns="" xmlns:ma14="http://schemas.microsoft.com/office/mac/drawingml/2011/main" val="1"/>
             </a:ext>
           </a:extLst>
         </p:spPr>
@@ -4259,14 +4265,14 @@
           </a:ln>
           <a:extLst>
             <a:ext uri="{909E8E84-426E-40dd-AFC4-6F175D3DCCD1}">
-              <a14:hiddenFill xmlns:a14="http://schemas.microsoft.com/office/drawing/2010/main" xmlns="">
+              <a14:hiddenFill xmlns="" xmlns:a14="http://schemas.microsoft.com/office/drawing/2010/main">
                 <a:solidFill>
                   <a:srgbClr val="FFFFFF"/>
                 </a:solidFill>
               </a14:hiddenFill>
             </a:ext>
             <a:ext uri="{91240B29-F687-4f45-9708-019B960494DF}">
-              <a14:hiddenLine xmlns:a14="http://schemas.microsoft.com/office/drawing/2010/main" xmlns="" w="9525">
+              <a14:hiddenLine xmlns="" xmlns:a14="http://schemas.microsoft.com/office/drawing/2010/main" w="9525">
                 <a:solidFill>
                   <a:srgbClr val="000000"/>
                 </a:solidFill>
@@ -4276,7 +4282,7 @@
               </a14:hiddenLine>
             </a:ext>
             <a:ext uri="{FAA26D3D-D897-4be2-8F04-BA451C77F1D7}">
-              <ma14:placeholderFlag xmlns:ma14="http://schemas.microsoft.com/office/mac/drawingml/2011/main" xmlns="" val="1"/>
+              <ma14:placeholderFlag xmlns="" xmlns:ma14="http://schemas.microsoft.com/office/mac/drawingml/2011/main" val="1"/>
             </a:ext>
           </a:extLst>
         </p:spPr>
@@ -4991,7 +4997,13 @@
   <p:cSld>
     <p:spTree>
       <p:nvGrpSpPr>
-        <p:cNvPr id="1" name=""/>
+        <p:cNvPr id="1" name="">
+          <a:extLst>
+            <a:ext uri="{FF2B5EF4-FFF2-40B4-BE49-F238E27FC236}">
+              <a16:creationId xmlns:a16="http://schemas.microsoft.com/office/drawing/2014/main" id="{A01019DE-764D-39D4-06A8-445CA55B48D9}"/>
+            </a:ext>
+          </a:extLst>
+        </p:cNvPr>
         <p:cNvGrpSpPr/>
         <p:nvPr/>
       </p:nvGrpSpPr>
@@ -5005,10 +5017,10 @@
       </p:grpSpPr>
       <p:sp>
         <p:nvSpPr>
-          <p:cNvPr id="4" name="Slide Number Placeholder 3">
-            <a:extLst>
-              <a:ext uri="{FF2B5EF4-FFF2-40B4-BE49-F238E27FC236}">
-                <a16:creationId xmlns:a16="http://schemas.microsoft.com/office/drawing/2014/main" id="{58001061-C3D2-D908-5577-0B23761AE2A9}"/>
+          <p:cNvPr id="2" name="Rubrik 1">
+            <a:extLst>
+              <a:ext uri="{FF2B5EF4-FFF2-40B4-BE49-F238E27FC236}">
+                <a16:creationId xmlns:a16="http://schemas.microsoft.com/office/drawing/2014/main" id="{C947127F-AB95-E392-9AB3-5FD68B19CE65}"/>
               </a:ext>
             </a:extLst>
           </p:cNvPr>
@@ -5016,29 +5028,263 @@
             <a:spLocks noGrp="1"/>
           </p:cNvSpPr>
           <p:nvPr>
-            <p:ph type="sldNum" sz="quarter" idx="4"/>
+            <p:ph type="ctrTitle"/>
           </p:nvPr>
         </p:nvSpPr>
-        <p:spPr/>
+        <p:spPr>
+          <a:xfrm>
+            <a:off x="267447" y="342766"/>
+            <a:ext cx="4468104" cy="631025"/>
+          </a:xfrm>
+        </p:spPr>
         <p:txBody>
           <a:bodyPr/>
           <a:lstStyle/>
           <a:p>
-            <a:fld id="{610C4E4B-DC7F-8F40-B47C-DF522102C54B}" type="slidenum">
-              <a:rPr lang="sv-SE" smtClean="0"/>
-              <a:pPr/>
-              <a:t>10</a:t>
-            </a:fld>
-            <a:endParaRPr lang="sv-SE"/>
+            <a:r>
+              <a:rPr lang="sv-SE" dirty="0" err="1"/>
+              <a:t>What</a:t>
+            </a:r>
+            <a:r>
+              <a:rPr lang="sv-SE" dirty="0"/>
+              <a:t> is </a:t>
+            </a:r>
+            <a:r>
+              <a:rPr lang="sv-SE" dirty="0" err="1"/>
+              <a:t>Laravel</a:t>
+            </a:r>
+            <a:r>
+              <a:rPr lang="sv-SE" dirty="0"/>
+              <a:t>?</a:t>
+            </a:r>
+          </a:p>
+        </p:txBody>
+      </p:sp>
+      <p:sp>
+        <p:nvSpPr>
+          <p:cNvPr id="3" name="Underrubrik 2">
+            <a:extLst>
+              <a:ext uri="{FF2B5EF4-FFF2-40B4-BE49-F238E27FC236}">
+                <a16:creationId xmlns:a16="http://schemas.microsoft.com/office/drawing/2014/main" id="{0BCEBEAF-67C8-8B48-2F48-813376FD5652}"/>
+              </a:ext>
+            </a:extLst>
+          </p:cNvPr>
+          <p:cNvSpPr>
+            <a:spLocks noGrp="1"/>
+          </p:cNvSpPr>
+          <p:nvPr>
+            <p:ph type="subTitle" idx="1"/>
+          </p:nvPr>
+        </p:nvSpPr>
+        <p:spPr>
+          <a:xfrm>
+            <a:off x="403412" y="1026084"/>
+            <a:ext cx="8387976" cy="3774649"/>
+          </a:xfrm>
+        </p:spPr>
+        <p:txBody>
+          <a:bodyPr/>
+          <a:lstStyle/>
+          <a:p>
+            <a:pPr marL="342900" indent="-342900" algn="l">
+              <a:buFont typeface="Arial" panose="020B0604020202020204" pitchFamily="34" charset="0"/>
+              <a:buChar char="•"/>
+            </a:pPr>
+            <a:r>
+              <a:rPr lang="sv-SE" dirty="0"/>
+              <a:t>”</a:t>
+            </a:r>
+            <a:r>
+              <a:rPr lang="en-GB" b="0" i="0" u="none" strike="noStrike" dirty="0">
+                <a:solidFill>
+                  <a:srgbClr val="565454"/>
+                </a:solidFill>
+                <a:effectLst/>
+                <a:latin typeface="scandia-web"/>
+              </a:rPr>
+              <a:t> </a:t>
+            </a:r>
+            <a:r>
+              <a:rPr lang="en-GB" dirty="0"/>
+              <a:t>Laravel is a web application framework with expressive, elegant syntax.”(1)</a:t>
+            </a:r>
+          </a:p>
+          <a:p>
+            <a:pPr marL="342900" indent="-342900" algn="l">
+              <a:buFont typeface="Arial" panose="020B0604020202020204" pitchFamily="34" charset="0"/>
+              <a:buChar char="•"/>
+            </a:pPr>
+            <a:r>
+              <a:rPr lang="en-US" dirty="0"/>
+              <a:t>Works efficiently with Vue or React</a:t>
+            </a:r>
+          </a:p>
+          <a:p>
+            <a:pPr marL="342900" indent="-342900" algn="l">
+              <a:buFont typeface="Arial" panose="020B0604020202020204" pitchFamily="34" charset="0"/>
+              <a:buChar char="•"/>
+            </a:pPr>
+            <a:r>
+              <a:rPr lang="en-US" dirty="0"/>
+              <a:t>Multiple starter kits – Breeze, Jetstream</a:t>
+            </a:r>
+          </a:p>
+        </p:txBody>
+      </p:sp>
+    </p:spTree>
+    <p:extLst>
+      <p:ext uri="{BB962C8B-B14F-4D97-AF65-F5344CB8AC3E}">
+        <p14:creationId xmlns:p14="http://schemas.microsoft.com/office/powerpoint/2010/main" val="3632928939"/>
+      </p:ext>
+    </p:extLst>
+  </p:cSld>
+  <p:clrMapOvr>
+    <a:masterClrMapping/>
+  </p:clrMapOvr>
+</p:sld>
+</file>
+
+<file path=ppt/slides/slide11.xml><?xml version="1.0" encoding="utf-8"?>
+<p:sld xmlns:a="http://schemas.openxmlformats.org/drawingml/2006/main" xmlns:r="http://schemas.openxmlformats.org/officeDocument/2006/relationships" xmlns:p="http://schemas.openxmlformats.org/presentationml/2006/main">
+  <p:cSld>
+    <p:spTree>
+      <p:nvGrpSpPr>
+        <p:cNvPr id="1" name="">
+          <a:extLst>
+            <a:ext uri="{FF2B5EF4-FFF2-40B4-BE49-F238E27FC236}">
+              <a16:creationId xmlns:a16="http://schemas.microsoft.com/office/drawing/2014/main" id="{BB5E160D-9A38-34B3-C96E-6696AF8F64CD}"/>
+            </a:ext>
+          </a:extLst>
+        </p:cNvPr>
+        <p:cNvGrpSpPr/>
+        <p:nvPr/>
+      </p:nvGrpSpPr>
+      <p:grpSpPr>
+        <a:xfrm>
+          <a:off x="0" y="0"/>
+          <a:ext cx="0" cy="0"/>
+          <a:chOff x="0" y="0"/>
+          <a:chExt cx="0" cy="0"/>
+        </a:xfrm>
+      </p:grpSpPr>
+      <p:sp>
+        <p:nvSpPr>
+          <p:cNvPr id="2" name="Rubrik 1">
+            <a:extLst>
+              <a:ext uri="{FF2B5EF4-FFF2-40B4-BE49-F238E27FC236}">
+                <a16:creationId xmlns:a16="http://schemas.microsoft.com/office/drawing/2014/main" id="{7A3A3C91-F5A8-B2DF-98DA-76314499F496}"/>
+              </a:ext>
+            </a:extLst>
+          </p:cNvPr>
+          <p:cNvSpPr>
+            <a:spLocks noGrp="1"/>
+          </p:cNvSpPr>
+          <p:nvPr>
+            <p:ph type="ctrTitle"/>
+          </p:nvPr>
+        </p:nvSpPr>
+        <p:spPr>
+          <a:xfrm>
+            <a:off x="267447" y="342766"/>
+            <a:ext cx="7443538" cy="631025"/>
+          </a:xfrm>
+        </p:spPr>
+        <p:txBody>
+          <a:bodyPr/>
+          <a:lstStyle/>
+          <a:p>
+            <a:r>
+              <a:rPr lang="sv-SE" dirty="0"/>
+              <a:t>Different </a:t>
+            </a:r>
+            <a:r>
+              <a:rPr lang="sv-SE" dirty="0" err="1"/>
+              <a:t>caching</a:t>
+            </a:r>
+            <a:r>
+              <a:rPr lang="sv-SE" dirty="0"/>
+              <a:t> </a:t>
+            </a:r>
+            <a:r>
+              <a:rPr lang="en-US" dirty="0"/>
+              <a:t>methods</a:t>
+            </a:r>
+          </a:p>
+        </p:txBody>
+      </p:sp>
+      <p:sp>
+        <p:nvSpPr>
+          <p:cNvPr id="3" name="Underrubrik 2">
+            <a:extLst>
+              <a:ext uri="{FF2B5EF4-FFF2-40B4-BE49-F238E27FC236}">
+                <a16:creationId xmlns:a16="http://schemas.microsoft.com/office/drawing/2014/main" id="{120E8E61-A3DD-D964-E987-0FCF70EB764D}"/>
+              </a:ext>
+            </a:extLst>
+          </p:cNvPr>
+          <p:cNvSpPr>
+            <a:spLocks noGrp="1"/>
+          </p:cNvSpPr>
+          <p:nvPr>
+            <p:ph type="subTitle" idx="1"/>
+          </p:nvPr>
+        </p:nvSpPr>
+        <p:spPr>
+          <a:xfrm>
+            <a:off x="403412" y="1026084"/>
+            <a:ext cx="8387976" cy="3774649"/>
+          </a:xfrm>
+        </p:spPr>
+        <p:txBody>
+          <a:bodyPr/>
+          <a:lstStyle/>
+          <a:p>
+            <a:pPr marL="342900" indent="-342900" algn="l">
+              <a:buFont typeface="Arial" panose="020B0604020202020204" pitchFamily="34" charset="0"/>
+              <a:buChar char="•"/>
+            </a:pPr>
+            <a:r>
+              <a:rPr lang="en-US" dirty="0"/>
+              <a:t>Laravel’s built in file cache driver</a:t>
+            </a:r>
+          </a:p>
+          <a:p>
+            <a:pPr marL="342900" indent="-342900" algn="l">
+              <a:buFont typeface="Arial" panose="020B0604020202020204" pitchFamily="34" charset="0"/>
+              <a:buChar char="•"/>
+            </a:pPr>
+            <a:r>
+              <a:rPr lang="en-US" dirty="0"/>
+              <a:t>Supported caching backends:</a:t>
+            </a:r>
+          </a:p>
+          <a:p>
+            <a:pPr marL="800100" lvl="1" indent="-342900" algn="l">
+              <a:buFont typeface="Wingdings" pitchFamily="2" charset="2"/>
+              <a:buChar char="§"/>
+            </a:pPr>
+            <a:r>
+              <a:rPr lang="en-US" dirty="0"/>
+              <a:t>Memcached</a:t>
+            </a:r>
+          </a:p>
+          <a:p>
+            <a:pPr marL="800100" lvl="1" indent="-342900" algn="l">
+              <a:buFont typeface="Wingdings" pitchFamily="2" charset="2"/>
+              <a:buChar char="§"/>
+            </a:pPr>
+            <a:r>
+              <a:rPr lang="en-US" dirty="0"/>
+              <a:t>Redis</a:t>
+            </a:r>
           </a:p>
         </p:txBody>
       </p:sp>
       <p:pic>
         <p:nvPicPr>
-          <p:cNvPr id="6" name="Picture 5" descr="A close-up of a computer screen&#10;&#10;Description automatically generated">
-            <a:extLst>
-              <a:ext uri="{FF2B5EF4-FFF2-40B4-BE49-F238E27FC236}">
-                <a16:creationId xmlns:a16="http://schemas.microsoft.com/office/drawing/2014/main" id="{B0889138-7A10-C9CF-2F43-18C0FC93CF1A}"/>
+          <p:cNvPr id="4" name="Picture 3">
+            <a:extLst>
+              <a:ext uri="{FF2B5EF4-FFF2-40B4-BE49-F238E27FC236}">
+                <a16:creationId xmlns:a16="http://schemas.microsoft.com/office/drawing/2014/main" id="{D05FEF93-7DDC-919E-C496-B2C4C6BEFA09}"/>
               </a:ext>
             </a:extLst>
           </p:cNvPr>
@@ -5055,20 +5301,55 @@
         </p:blipFill>
         <p:spPr>
           <a:xfrm>
-            <a:off x="270060" y="258109"/>
-            <a:ext cx="7666495" cy="1317930"/>
+            <a:off x="2073322" y="2913408"/>
+            <a:ext cx="1754022" cy="1754022"/>
           </a:xfrm>
           <a:prstGeom prst="rect">
             <a:avLst/>
           </a:prstGeom>
         </p:spPr>
       </p:pic>
+      <p:sp>
+        <p:nvSpPr>
+          <p:cNvPr id="5" name="TextBox 4">
+            <a:extLst>
+              <a:ext uri="{FF2B5EF4-FFF2-40B4-BE49-F238E27FC236}">
+                <a16:creationId xmlns:a16="http://schemas.microsoft.com/office/drawing/2014/main" id="{619A3834-F37A-ED60-5FDA-F81B6D68B819}"/>
+              </a:ext>
+            </a:extLst>
+          </p:cNvPr>
+          <p:cNvSpPr txBox="1"/>
+          <p:nvPr/>
+        </p:nvSpPr>
+        <p:spPr>
+          <a:xfrm>
+            <a:off x="2620368" y="4673775"/>
+            <a:ext cx="880281" cy="253916"/>
+          </a:xfrm>
+          <a:prstGeom prst="rect">
+            <a:avLst/>
+          </a:prstGeom>
+          <a:noFill/>
+        </p:spPr>
+        <p:txBody>
+          <a:bodyPr wrap="square" rtlCol="0">
+            <a:spAutoFit/>
+          </a:bodyPr>
+          <a:lstStyle/>
+          <a:p>
+            <a:r>
+              <a:rPr lang="en-US" sz="1050" dirty="0"/>
+              <a:t>Figure 3.</a:t>
+            </a:r>
+          </a:p>
+        </p:txBody>
+      </p:sp>
       <p:pic>
         <p:nvPicPr>
-          <p:cNvPr id="8" name="Picture 7" descr="A computer screen shot of a program code&#10;&#10;Description automatically generated">
-            <a:extLst>
-              <a:ext uri="{FF2B5EF4-FFF2-40B4-BE49-F238E27FC236}">
-                <a16:creationId xmlns:a16="http://schemas.microsoft.com/office/drawing/2014/main" id="{2AA7DF8F-6BB0-705C-8DEF-15882DB88BE3}"/>
+          <p:cNvPr id="6" name="Picture 5">
+            <a:extLst>
+              <a:ext uri="{FF2B5EF4-FFF2-40B4-BE49-F238E27FC236}">
+                <a16:creationId xmlns:a16="http://schemas.microsoft.com/office/drawing/2014/main" id="{B37C11A8-E1AF-7D2F-72AC-5E51A7C8B25C}"/>
               </a:ext>
             </a:extLst>
           </p:cNvPr>
@@ -5085,18 +5366,53 @@
         </p:blipFill>
         <p:spPr>
           <a:xfrm>
-            <a:off x="270061" y="1886805"/>
-            <a:ext cx="5166191" cy="2625721"/>
+            <a:off x="4800222" y="2169140"/>
+            <a:ext cx="3018287" cy="2012191"/>
           </a:xfrm>
           <a:prstGeom prst="rect">
             <a:avLst/>
           </a:prstGeom>
         </p:spPr>
       </p:pic>
+      <p:sp>
+        <p:nvSpPr>
+          <p:cNvPr id="7" name="TextBox 6">
+            <a:extLst>
+              <a:ext uri="{FF2B5EF4-FFF2-40B4-BE49-F238E27FC236}">
+                <a16:creationId xmlns:a16="http://schemas.microsoft.com/office/drawing/2014/main" id="{C69A558C-7ADF-D924-5BEC-5ABB3BFE872C}"/>
+              </a:ext>
+            </a:extLst>
+          </p:cNvPr>
+          <p:cNvSpPr txBox="1"/>
+          <p:nvPr/>
+        </p:nvSpPr>
+        <p:spPr>
+          <a:xfrm>
+            <a:off x="6107371" y="3663461"/>
+            <a:ext cx="880281" cy="253916"/>
+          </a:xfrm>
+          <a:prstGeom prst="rect">
+            <a:avLst/>
+          </a:prstGeom>
+          <a:noFill/>
+        </p:spPr>
+        <p:txBody>
+          <a:bodyPr wrap="square" rtlCol="0">
+            <a:spAutoFit/>
+          </a:bodyPr>
+          <a:lstStyle/>
+          <a:p>
+            <a:r>
+              <a:rPr lang="en-US" sz="1050" dirty="0"/>
+              <a:t>Figure 4.</a:t>
+            </a:r>
+          </a:p>
+        </p:txBody>
+      </p:sp>
     </p:spTree>
     <p:extLst>
       <p:ext uri="{BB962C8B-B14F-4D97-AF65-F5344CB8AC3E}">
-        <p14:creationId xmlns:p14="http://schemas.microsoft.com/office/powerpoint/2010/main" val="3026030767"/>
+        <p14:creationId xmlns:p14="http://schemas.microsoft.com/office/powerpoint/2010/main" val="1438881812"/>
       </p:ext>
     </p:extLst>
   </p:cSld>
@@ -5106,7 +5422,486 @@
 </p:sld>
 </file>
 
-<file path=ppt/slides/slide11.xml><?xml version="1.0" encoding="utf-8"?>
+<file path=ppt/slides/slide12.xml><?xml version="1.0" encoding="utf-8"?>
+<p:sld xmlns:a="http://schemas.openxmlformats.org/drawingml/2006/main" xmlns:r="http://schemas.openxmlformats.org/officeDocument/2006/relationships" xmlns:p="http://schemas.openxmlformats.org/presentationml/2006/main">
+  <p:cSld>
+    <p:spTree>
+      <p:nvGrpSpPr>
+        <p:cNvPr id="1" name="">
+          <a:extLst>
+            <a:ext uri="{FF2B5EF4-FFF2-40B4-BE49-F238E27FC236}">
+              <a16:creationId xmlns:a16="http://schemas.microsoft.com/office/drawing/2014/main" id="{E98A4CB1-E5F4-14DE-7DF0-F51382023D4A}"/>
+            </a:ext>
+          </a:extLst>
+        </p:cNvPr>
+        <p:cNvGrpSpPr/>
+        <p:nvPr/>
+      </p:nvGrpSpPr>
+      <p:grpSpPr>
+        <a:xfrm>
+          <a:off x="0" y="0"/>
+          <a:ext cx="0" cy="0"/>
+          <a:chOff x="0" y="0"/>
+          <a:chExt cx="0" cy="0"/>
+        </a:xfrm>
+      </p:grpSpPr>
+      <p:sp>
+        <p:nvSpPr>
+          <p:cNvPr id="2" name="Rubrik 1">
+            <a:extLst>
+              <a:ext uri="{FF2B5EF4-FFF2-40B4-BE49-F238E27FC236}">
+                <a16:creationId xmlns:a16="http://schemas.microsoft.com/office/drawing/2014/main" id="{4A8FBD66-48BF-00B7-6D0B-96FAD402D626}"/>
+              </a:ext>
+            </a:extLst>
+          </p:cNvPr>
+          <p:cNvSpPr>
+            <a:spLocks noGrp="1"/>
+          </p:cNvSpPr>
+          <p:nvPr>
+            <p:ph type="ctrTitle"/>
+          </p:nvPr>
+        </p:nvSpPr>
+        <p:spPr>
+          <a:xfrm>
+            <a:off x="267446" y="342766"/>
+            <a:ext cx="4898231" cy="631025"/>
+          </a:xfrm>
+        </p:spPr>
+        <p:txBody>
+          <a:bodyPr/>
+          <a:lstStyle/>
+          <a:p>
+            <a:r>
+              <a:rPr lang="sv-SE" dirty="0" err="1"/>
+              <a:t>Loading</a:t>
+            </a:r>
+            <a:r>
+              <a:rPr lang="sv-SE" dirty="0"/>
+              <a:t> the site</a:t>
+            </a:r>
+          </a:p>
+        </p:txBody>
+      </p:sp>
+      <p:sp>
+        <p:nvSpPr>
+          <p:cNvPr id="3" name="Underrubrik 2">
+            <a:extLst>
+              <a:ext uri="{FF2B5EF4-FFF2-40B4-BE49-F238E27FC236}">
+                <a16:creationId xmlns:a16="http://schemas.microsoft.com/office/drawing/2014/main" id="{084F3F7F-619D-9441-B256-82C4B8B0C16F}"/>
+              </a:ext>
+            </a:extLst>
+          </p:cNvPr>
+          <p:cNvSpPr>
+            <a:spLocks noGrp="1"/>
+          </p:cNvSpPr>
+          <p:nvPr>
+            <p:ph type="subTitle" idx="1"/>
+          </p:nvPr>
+        </p:nvSpPr>
+        <p:spPr>
+          <a:xfrm>
+            <a:off x="403412" y="1026084"/>
+            <a:ext cx="8387976" cy="3774649"/>
+          </a:xfrm>
+        </p:spPr>
+        <p:txBody>
+          <a:bodyPr/>
+          <a:lstStyle/>
+          <a:p>
+            <a:pPr marL="342900" indent="-342900" algn="l">
+              <a:buFont typeface="Arial" panose="020B0604020202020204" pitchFamily="34" charset="0"/>
+              <a:buChar char="•"/>
+            </a:pPr>
+            <a:r>
+              <a:rPr lang="en-US" dirty="0"/>
+              <a:t>Storing all data from the database into the cache</a:t>
+            </a:r>
+          </a:p>
+          <a:p>
+            <a:pPr marL="342900" indent="-342900" algn="l">
+              <a:buFont typeface="Arial" panose="020B0604020202020204" pitchFamily="34" charset="0"/>
+              <a:buChar char="•"/>
+            </a:pPr>
+            <a:r>
+              <a:rPr lang="en-US" dirty="0"/>
+              <a:t>Returning all needed data to load the site</a:t>
+            </a:r>
+          </a:p>
+        </p:txBody>
+      </p:sp>
+      <p:pic>
+        <p:nvPicPr>
+          <p:cNvPr id="4" name="Picture 3" descr="A close-up of a computer screen&#10;&#10;Description automatically generated">
+            <a:extLst>
+              <a:ext uri="{FF2B5EF4-FFF2-40B4-BE49-F238E27FC236}">
+                <a16:creationId xmlns:a16="http://schemas.microsoft.com/office/drawing/2014/main" id="{78F3776E-2811-B915-7BE9-5663BA357CF6}"/>
+              </a:ext>
+            </a:extLst>
+          </p:cNvPr>
+          <p:cNvPicPr>
+            <a:picLocks noChangeAspect="1"/>
+          </p:cNvPicPr>
+          <p:nvPr/>
+        </p:nvPicPr>
+        <p:blipFill>
+          <a:blip r:embed="rId2"/>
+          <a:stretch>
+            <a:fillRect/>
+          </a:stretch>
+        </p:blipFill>
+        <p:spPr>
+          <a:xfrm>
+            <a:off x="403412" y="2038832"/>
+            <a:ext cx="8264182" cy="1420677"/>
+          </a:xfrm>
+          <a:prstGeom prst="rect">
+            <a:avLst/>
+          </a:prstGeom>
+        </p:spPr>
+      </p:pic>
+    </p:spTree>
+    <p:extLst>
+      <p:ext uri="{BB962C8B-B14F-4D97-AF65-F5344CB8AC3E}">
+        <p14:creationId xmlns:p14="http://schemas.microsoft.com/office/powerpoint/2010/main" val="2421979219"/>
+      </p:ext>
+    </p:extLst>
+  </p:cSld>
+  <p:clrMapOvr>
+    <a:masterClrMapping/>
+  </p:clrMapOvr>
+</p:sld>
+</file>
+
+<file path=ppt/slides/slide13.xml><?xml version="1.0" encoding="utf-8"?>
+<p:sld xmlns:a="http://schemas.openxmlformats.org/drawingml/2006/main" xmlns:r="http://schemas.openxmlformats.org/officeDocument/2006/relationships" xmlns:p="http://schemas.openxmlformats.org/presentationml/2006/main">
+  <p:cSld>
+    <p:spTree>
+      <p:nvGrpSpPr>
+        <p:cNvPr id="1" name="">
+          <a:extLst>
+            <a:ext uri="{FF2B5EF4-FFF2-40B4-BE49-F238E27FC236}">
+              <a16:creationId xmlns:a16="http://schemas.microsoft.com/office/drawing/2014/main" id="{B20932EC-EBC2-B26C-5CB1-BA460DBD31DF}"/>
+            </a:ext>
+          </a:extLst>
+        </p:cNvPr>
+        <p:cNvGrpSpPr/>
+        <p:nvPr/>
+      </p:nvGrpSpPr>
+      <p:grpSpPr>
+        <a:xfrm>
+          <a:off x="0" y="0"/>
+          <a:ext cx="0" cy="0"/>
+          <a:chOff x="0" y="0"/>
+          <a:chExt cx="0" cy="0"/>
+        </a:xfrm>
+      </p:grpSpPr>
+      <p:sp>
+        <p:nvSpPr>
+          <p:cNvPr id="2" name="Rubrik 1">
+            <a:extLst>
+              <a:ext uri="{FF2B5EF4-FFF2-40B4-BE49-F238E27FC236}">
+                <a16:creationId xmlns:a16="http://schemas.microsoft.com/office/drawing/2014/main" id="{A60473A6-9813-9EC5-5CC2-855C141178B1}"/>
+              </a:ext>
+            </a:extLst>
+          </p:cNvPr>
+          <p:cNvSpPr>
+            <a:spLocks noGrp="1"/>
+          </p:cNvSpPr>
+          <p:nvPr>
+            <p:ph type="ctrTitle"/>
+          </p:nvPr>
+        </p:nvSpPr>
+        <p:spPr>
+          <a:xfrm>
+            <a:off x="267446" y="342766"/>
+            <a:ext cx="5717097" cy="631025"/>
+          </a:xfrm>
+        </p:spPr>
+        <p:txBody>
+          <a:bodyPr/>
+          <a:lstStyle/>
+          <a:p>
+            <a:r>
+              <a:rPr lang="sv-SE" dirty="0"/>
+              <a:t>From cache to </a:t>
+            </a:r>
+            <a:r>
+              <a:rPr lang="sv-SE" dirty="0" err="1"/>
+              <a:t>usage</a:t>
+            </a:r>
+            <a:endParaRPr lang="sv-SE" dirty="0"/>
+          </a:p>
+        </p:txBody>
+      </p:sp>
+      <p:sp>
+        <p:nvSpPr>
+          <p:cNvPr id="3" name="Underrubrik 2">
+            <a:extLst>
+              <a:ext uri="{FF2B5EF4-FFF2-40B4-BE49-F238E27FC236}">
+                <a16:creationId xmlns:a16="http://schemas.microsoft.com/office/drawing/2014/main" id="{BFFA24B7-6859-EC30-5C7D-D5FADABADD43}"/>
+              </a:ext>
+            </a:extLst>
+          </p:cNvPr>
+          <p:cNvSpPr>
+            <a:spLocks noGrp="1"/>
+          </p:cNvSpPr>
+          <p:nvPr>
+            <p:ph type="subTitle" idx="1"/>
+          </p:nvPr>
+        </p:nvSpPr>
+        <p:spPr>
+          <a:xfrm>
+            <a:off x="403412" y="1026084"/>
+            <a:ext cx="8387976" cy="3774649"/>
+          </a:xfrm>
+        </p:spPr>
+        <p:txBody>
+          <a:bodyPr/>
+          <a:lstStyle/>
+          <a:p>
+            <a:pPr marL="342900" indent="-342900" algn="l">
+              <a:buFont typeface="Arial" panose="020B0604020202020204" pitchFamily="34" charset="0"/>
+              <a:buChar char="•"/>
+            </a:pPr>
+            <a:r>
+              <a:rPr lang="en-US" dirty="0"/>
+              <a:t>Getting all the services from the cache</a:t>
+            </a:r>
+          </a:p>
+          <a:p>
+            <a:pPr marL="342900" indent="-342900" algn="l">
+              <a:buFont typeface="Arial" panose="020B0604020202020204" pitchFamily="34" charset="0"/>
+              <a:buChar char="•"/>
+            </a:pPr>
+            <a:r>
+              <a:rPr lang="en-US" dirty="0"/>
+              <a:t>Getting the selected services</a:t>
+            </a:r>
+          </a:p>
+        </p:txBody>
+      </p:sp>
+      <p:pic>
+        <p:nvPicPr>
+          <p:cNvPr id="6" name="Picture 5" descr="A computer code with text&#10;&#10;Description automatically generated with medium confidence">
+            <a:extLst>
+              <a:ext uri="{FF2B5EF4-FFF2-40B4-BE49-F238E27FC236}">
+                <a16:creationId xmlns:a16="http://schemas.microsoft.com/office/drawing/2014/main" id="{C438CC45-768D-464C-D846-7C59D5653921}"/>
+              </a:ext>
+            </a:extLst>
+          </p:cNvPr>
+          <p:cNvPicPr>
+            <a:picLocks noChangeAspect="1"/>
+          </p:cNvPicPr>
+          <p:nvPr/>
+        </p:nvPicPr>
+        <p:blipFill>
+          <a:blip r:embed="rId2"/>
+          <a:stretch>
+            <a:fillRect/>
+          </a:stretch>
+        </p:blipFill>
+        <p:spPr>
+          <a:xfrm>
+            <a:off x="403412" y="2540711"/>
+            <a:ext cx="6450157" cy="1576705"/>
+          </a:xfrm>
+          <a:prstGeom prst="rect">
+            <a:avLst/>
+          </a:prstGeom>
+        </p:spPr>
+      </p:pic>
+    </p:spTree>
+    <p:extLst>
+      <p:ext uri="{BB962C8B-B14F-4D97-AF65-F5344CB8AC3E}">
+        <p14:creationId xmlns:p14="http://schemas.microsoft.com/office/powerpoint/2010/main" val="1790243740"/>
+      </p:ext>
+    </p:extLst>
+  </p:cSld>
+  <p:clrMapOvr>
+    <a:masterClrMapping/>
+  </p:clrMapOvr>
+</p:sld>
+</file>
+
+<file path=ppt/slides/slide14.xml><?xml version="1.0" encoding="utf-8"?>
+<p:sld xmlns:a="http://schemas.openxmlformats.org/drawingml/2006/main" xmlns:r="http://schemas.openxmlformats.org/officeDocument/2006/relationships" xmlns:p="http://schemas.openxmlformats.org/presentationml/2006/main">
+  <p:cSld>
+    <p:spTree>
+      <p:nvGrpSpPr>
+        <p:cNvPr id="1" name="">
+          <a:extLst>
+            <a:ext uri="{FF2B5EF4-FFF2-40B4-BE49-F238E27FC236}">
+              <a16:creationId xmlns:a16="http://schemas.microsoft.com/office/drawing/2014/main" id="{97EB981D-202B-D168-99BB-3788A2DAF38A}"/>
+            </a:ext>
+          </a:extLst>
+        </p:cNvPr>
+        <p:cNvGrpSpPr/>
+        <p:nvPr/>
+      </p:nvGrpSpPr>
+      <p:grpSpPr>
+        <a:xfrm>
+          <a:off x="0" y="0"/>
+          <a:ext cx="0" cy="0"/>
+          <a:chOff x="0" y="0"/>
+          <a:chExt cx="0" cy="0"/>
+        </a:xfrm>
+      </p:grpSpPr>
+      <p:sp>
+        <p:nvSpPr>
+          <p:cNvPr id="2" name="Rubrik 1">
+            <a:extLst>
+              <a:ext uri="{FF2B5EF4-FFF2-40B4-BE49-F238E27FC236}">
+                <a16:creationId xmlns:a16="http://schemas.microsoft.com/office/drawing/2014/main" id="{0A7E3474-0237-E4A5-18EA-D38F65859E00}"/>
+              </a:ext>
+            </a:extLst>
+          </p:cNvPr>
+          <p:cNvSpPr>
+            <a:spLocks noGrp="1"/>
+          </p:cNvSpPr>
+          <p:nvPr>
+            <p:ph type="ctrTitle"/>
+          </p:nvPr>
+        </p:nvSpPr>
+        <p:spPr>
+          <a:xfrm>
+            <a:off x="267446" y="342767"/>
+            <a:ext cx="8583127" cy="592106"/>
+          </a:xfrm>
+        </p:spPr>
+        <p:txBody>
+          <a:bodyPr/>
+          <a:lstStyle/>
+          <a:p>
+            <a:r>
+              <a:rPr lang="sv-SE" dirty="0" err="1"/>
+              <a:t>Selecting</a:t>
+            </a:r>
+            <a:r>
+              <a:rPr lang="sv-SE" dirty="0"/>
+              <a:t> services – </a:t>
+            </a:r>
+            <a:r>
+              <a:rPr lang="sv-SE" dirty="0" err="1"/>
+              <a:t>without</a:t>
+            </a:r>
+            <a:r>
+              <a:rPr lang="sv-SE" dirty="0"/>
+              <a:t> cache</a:t>
+            </a:r>
+          </a:p>
+        </p:txBody>
+      </p:sp>
+      <p:sp>
+        <p:nvSpPr>
+          <p:cNvPr id="3" name="Underrubrik 2">
+            <a:extLst>
+              <a:ext uri="{FF2B5EF4-FFF2-40B4-BE49-F238E27FC236}">
+                <a16:creationId xmlns:a16="http://schemas.microsoft.com/office/drawing/2014/main" id="{9623F420-EEF6-F434-6022-EB5AF7766869}"/>
+              </a:ext>
+            </a:extLst>
+          </p:cNvPr>
+          <p:cNvSpPr>
+            <a:spLocks noGrp="1"/>
+          </p:cNvSpPr>
+          <p:nvPr>
+            <p:ph type="subTitle" idx="1"/>
+          </p:nvPr>
+        </p:nvSpPr>
+        <p:spPr>
+          <a:xfrm>
+            <a:off x="403412" y="1026084"/>
+            <a:ext cx="8387976" cy="3774649"/>
+          </a:xfrm>
+        </p:spPr>
+        <p:txBody>
+          <a:bodyPr/>
+          <a:lstStyle/>
+          <a:p>
+            <a:pPr marL="342900" indent="-342900" algn="l">
+              <a:buFont typeface="Arial" panose="020B0604020202020204" pitchFamily="34" charset="0"/>
+              <a:buChar char="•"/>
+            </a:pPr>
+            <a:r>
+              <a:rPr lang="en-US" dirty="0"/>
+              <a:t>Checking how many services were selected</a:t>
+            </a:r>
+          </a:p>
+          <a:p>
+            <a:pPr marL="342900" indent="-342900" algn="l">
+              <a:buFont typeface="Arial" panose="020B0604020202020204" pitchFamily="34" charset="0"/>
+              <a:buChar char="•"/>
+            </a:pPr>
+            <a:r>
+              <a:rPr lang="en-US" dirty="0"/>
+              <a:t>Calculating the total price</a:t>
+            </a:r>
+          </a:p>
+          <a:p>
+            <a:pPr marL="342900" indent="-342900" algn="l">
+              <a:buFont typeface="Arial" panose="020B0604020202020204" pitchFamily="34" charset="0"/>
+              <a:buChar char="•"/>
+            </a:pPr>
+            <a:r>
+              <a:rPr lang="en-US" dirty="0"/>
+              <a:t>Storing the data into the cache</a:t>
+            </a:r>
+          </a:p>
+          <a:p>
+            <a:pPr marL="342900" indent="-342900" algn="l">
+              <a:buFont typeface="Arial" panose="020B0604020202020204" pitchFamily="34" charset="0"/>
+              <a:buChar char="•"/>
+            </a:pPr>
+            <a:r>
+              <a:rPr lang="en-US" dirty="0"/>
+              <a:t>Slow</a:t>
+            </a:r>
+          </a:p>
+        </p:txBody>
+      </p:sp>
+      <p:pic>
+        <p:nvPicPr>
+          <p:cNvPr id="9" name="Picture 8">
+            <a:extLst>
+              <a:ext uri="{FF2B5EF4-FFF2-40B4-BE49-F238E27FC236}">
+                <a16:creationId xmlns:a16="http://schemas.microsoft.com/office/drawing/2014/main" id="{C6219EE8-9934-FE5D-C577-87E6B40B80C6}"/>
+              </a:ext>
+            </a:extLst>
+          </p:cNvPr>
+          <p:cNvPicPr>
+            <a:picLocks noChangeAspect="1"/>
+          </p:cNvPicPr>
+          <p:nvPr/>
+        </p:nvPicPr>
+        <p:blipFill>
+          <a:blip r:embed="rId2"/>
+          <a:stretch>
+            <a:fillRect/>
+          </a:stretch>
+        </p:blipFill>
+        <p:spPr>
+          <a:xfrm>
+            <a:off x="784694" y="2759123"/>
+            <a:ext cx="3812706" cy="625522"/>
+          </a:xfrm>
+          <a:prstGeom prst="rect">
+            <a:avLst/>
+          </a:prstGeom>
+        </p:spPr>
+      </p:pic>
+    </p:spTree>
+    <p:extLst>
+      <p:ext uri="{BB962C8B-B14F-4D97-AF65-F5344CB8AC3E}">
+        <p14:creationId xmlns:p14="http://schemas.microsoft.com/office/powerpoint/2010/main" val="613620314"/>
+      </p:ext>
+    </p:extLst>
+  </p:cSld>
+  <p:clrMapOvr>
+    <a:masterClrMapping/>
+  </p:clrMapOvr>
+</p:sld>
+</file>
+
+<file path=ppt/slides/slide15.xml><?xml version="1.0" encoding="utf-8"?>
 <p:sld xmlns:a="http://schemas.openxmlformats.org/drawingml/2006/main" xmlns:r="http://schemas.openxmlformats.org/officeDocument/2006/relationships" xmlns:p="http://schemas.openxmlformats.org/presentationml/2006/main">
   <p:cSld>
     <p:spTree>
@@ -5147,7 +5942,7 @@
             <a:fld id="{610C4E4B-DC7F-8F40-B47C-DF522102C54B}" type="slidenum">
               <a:rPr lang="sv-SE" smtClean="0"/>
               <a:pPr/>
-              <a:t>11</a:t>
+              <a:t>15</a:t>
             </a:fld>
             <a:endParaRPr lang="sv-SE"/>
           </a:p>
@@ -5196,7 +5991,202 @@
 </p:sld>
 </file>
 
-<file path=ppt/slides/slide12.xml><?xml version="1.0" encoding="utf-8"?>
+<file path=ppt/slides/slide16.xml><?xml version="1.0" encoding="utf-8"?>
+<p:sld xmlns:a="http://schemas.openxmlformats.org/drawingml/2006/main" xmlns:r="http://schemas.openxmlformats.org/officeDocument/2006/relationships" xmlns:p="http://schemas.openxmlformats.org/presentationml/2006/main">
+  <p:cSld>
+    <p:spTree>
+      <p:nvGrpSpPr>
+        <p:cNvPr id="1" name="">
+          <a:extLst>
+            <a:ext uri="{FF2B5EF4-FFF2-40B4-BE49-F238E27FC236}">
+              <a16:creationId xmlns:a16="http://schemas.microsoft.com/office/drawing/2014/main" id="{511365F3-3545-FD98-5B59-840FAD5A1764}"/>
+            </a:ext>
+          </a:extLst>
+        </p:cNvPr>
+        <p:cNvGrpSpPr/>
+        <p:nvPr/>
+      </p:nvGrpSpPr>
+      <p:grpSpPr>
+        <a:xfrm>
+          <a:off x="0" y="0"/>
+          <a:ext cx="0" cy="0"/>
+          <a:chOff x="0" y="0"/>
+          <a:chExt cx="0" cy="0"/>
+        </a:xfrm>
+      </p:grpSpPr>
+      <p:sp>
+        <p:nvSpPr>
+          <p:cNvPr id="2" name="Rubrik 1">
+            <a:extLst>
+              <a:ext uri="{FF2B5EF4-FFF2-40B4-BE49-F238E27FC236}">
+                <a16:creationId xmlns:a16="http://schemas.microsoft.com/office/drawing/2014/main" id="{22CE4898-9152-FDE1-9C60-078AE9ED3E2F}"/>
+              </a:ext>
+            </a:extLst>
+          </p:cNvPr>
+          <p:cNvSpPr>
+            <a:spLocks noGrp="1"/>
+          </p:cNvSpPr>
+          <p:nvPr>
+            <p:ph type="ctrTitle"/>
+          </p:nvPr>
+        </p:nvSpPr>
+        <p:spPr>
+          <a:xfrm>
+            <a:off x="267446" y="342767"/>
+            <a:ext cx="8583127" cy="592106"/>
+          </a:xfrm>
+        </p:spPr>
+        <p:txBody>
+          <a:bodyPr/>
+          <a:lstStyle/>
+          <a:p>
+            <a:r>
+              <a:rPr lang="sv-SE" dirty="0" err="1"/>
+              <a:t>Selecting</a:t>
+            </a:r>
+            <a:r>
+              <a:rPr lang="sv-SE" dirty="0"/>
+              <a:t> services – </a:t>
+            </a:r>
+            <a:r>
+              <a:rPr lang="sv-SE" dirty="0" err="1"/>
+              <a:t>with</a:t>
+            </a:r>
+            <a:r>
+              <a:rPr lang="sv-SE" dirty="0"/>
+              <a:t> cache</a:t>
+            </a:r>
+          </a:p>
+        </p:txBody>
+      </p:sp>
+      <p:sp>
+        <p:nvSpPr>
+          <p:cNvPr id="3" name="Underrubrik 2">
+            <a:extLst>
+              <a:ext uri="{FF2B5EF4-FFF2-40B4-BE49-F238E27FC236}">
+                <a16:creationId xmlns:a16="http://schemas.microsoft.com/office/drawing/2014/main" id="{26999F0A-E673-2948-AE0A-FAA860255097}"/>
+              </a:ext>
+            </a:extLst>
+          </p:cNvPr>
+          <p:cNvSpPr>
+            <a:spLocks noGrp="1"/>
+          </p:cNvSpPr>
+          <p:nvPr>
+            <p:ph type="subTitle" idx="1"/>
+          </p:nvPr>
+        </p:nvSpPr>
+        <p:spPr>
+          <a:xfrm>
+            <a:off x="403412" y="1026084"/>
+            <a:ext cx="8387976" cy="3774649"/>
+          </a:xfrm>
+        </p:spPr>
+        <p:txBody>
+          <a:bodyPr/>
+          <a:lstStyle/>
+          <a:p>
+            <a:pPr marL="342900" indent="-342900" algn="l">
+              <a:buFont typeface="Arial" panose="020B0604020202020204" pitchFamily="34" charset="0"/>
+              <a:buChar char="•"/>
+            </a:pPr>
+            <a:r>
+              <a:rPr lang="en-US" dirty="0"/>
+              <a:t>Get all selected services and total price from the cache</a:t>
+            </a:r>
+          </a:p>
+          <a:p>
+            <a:pPr marL="342900" indent="-342900" algn="l">
+              <a:buFont typeface="Arial" panose="020B0604020202020204" pitchFamily="34" charset="0"/>
+              <a:buChar char="•"/>
+            </a:pPr>
+            <a:r>
+              <a:rPr lang="en-US" dirty="0"/>
+              <a:t>Significantly faster</a:t>
+            </a:r>
+          </a:p>
+          <a:p>
+            <a:pPr marL="342900" indent="-342900" algn="l">
+              <a:buFont typeface="Arial" panose="020B0604020202020204" pitchFamily="34" charset="0"/>
+              <a:buChar char="•"/>
+            </a:pPr>
+            <a:endParaRPr lang="en-US" dirty="0"/>
+          </a:p>
+        </p:txBody>
+      </p:sp>
+      <p:pic>
+        <p:nvPicPr>
+          <p:cNvPr id="5" name="Picture 4" descr="A computer code with text&#10;&#10;Description automatically generated with medium confidence">
+            <a:extLst>
+              <a:ext uri="{FF2B5EF4-FFF2-40B4-BE49-F238E27FC236}">
+                <a16:creationId xmlns:a16="http://schemas.microsoft.com/office/drawing/2014/main" id="{294E9FDB-259B-9D15-E570-A61EB2316E50}"/>
+              </a:ext>
+            </a:extLst>
+          </p:cNvPr>
+          <p:cNvPicPr>
+            <a:picLocks noChangeAspect="1"/>
+          </p:cNvPicPr>
+          <p:nvPr/>
+        </p:nvPicPr>
+        <p:blipFill>
+          <a:blip r:embed="rId2"/>
+          <a:stretch>
+            <a:fillRect/>
+          </a:stretch>
+        </p:blipFill>
+        <p:spPr>
+          <a:xfrm>
+            <a:off x="664761" y="2711345"/>
+            <a:ext cx="5902392" cy="1847007"/>
+          </a:xfrm>
+          <a:prstGeom prst="rect">
+            <a:avLst/>
+          </a:prstGeom>
+        </p:spPr>
+      </p:pic>
+      <p:pic>
+        <p:nvPicPr>
+          <p:cNvPr id="7" name="Picture 6">
+            <a:extLst>
+              <a:ext uri="{FF2B5EF4-FFF2-40B4-BE49-F238E27FC236}">
+                <a16:creationId xmlns:a16="http://schemas.microsoft.com/office/drawing/2014/main" id="{C4272699-ACBC-5F53-176D-6111AFA4A4C1}"/>
+              </a:ext>
+            </a:extLst>
+          </p:cNvPr>
+          <p:cNvPicPr>
+            <a:picLocks noChangeAspect="1"/>
+          </p:cNvPicPr>
+          <p:nvPr/>
+        </p:nvPicPr>
+        <p:blipFill>
+          <a:blip r:embed="rId3"/>
+          <a:stretch>
+            <a:fillRect/>
+          </a:stretch>
+        </p:blipFill>
+        <p:spPr>
+          <a:xfrm>
+            <a:off x="664761" y="1939404"/>
+            <a:ext cx="3854299" cy="632346"/>
+          </a:xfrm>
+          <a:prstGeom prst="rect">
+            <a:avLst/>
+          </a:prstGeom>
+        </p:spPr>
+      </p:pic>
+    </p:spTree>
+    <p:extLst>
+      <p:ext uri="{BB962C8B-B14F-4D97-AF65-F5344CB8AC3E}">
+        <p14:creationId xmlns:p14="http://schemas.microsoft.com/office/powerpoint/2010/main" val="1873698541"/>
+      </p:ext>
+    </p:extLst>
+  </p:cSld>
+  <p:clrMapOvr>
+    <a:masterClrMapping/>
+  </p:clrMapOvr>
+</p:sld>
+</file>
+
+<file path=ppt/slides/slide17.xml><?xml version="1.0" encoding="utf-8"?>
 <p:sld xmlns:a="http://schemas.openxmlformats.org/drawingml/2006/main" xmlns:r="http://schemas.openxmlformats.org/officeDocument/2006/relationships" xmlns:p="http://schemas.openxmlformats.org/presentationml/2006/main">
   <p:cSld>
     <p:spTree>
@@ -5380,6 +6370,41 @@
           </a:prstGeom>
         </p:spPr>
       </p:pic>
+      <p:sp>
+        <p:nvSpPr>
+          <p:cNvPr id="5" name="TextBox 4">
+            <a:extLst>
+              <a:ext uri="{FF2B5EF4-FFF2-40B4-BE49-F238E27FC236}">
+                <a16:creationId xmlns:a16="http://schemas.microsoft.com/office/drawing/2014/main" id="{5968975C-698D-4660-2FFF-AEFF81F2D44F}"/>
+              </a:ext>
+            </a:extLst>
+          </p:cNvPr>
+          <p:cNvSpPr txBox="1"/>
+          <p:nvPr/>
+        </p:nvSpPr>
+        <p:spPr>
+          <a:xfrm>
+            <a:off x="5909478" y="4117416"/>
+            <a:ext cx="880281" cy="253916"/>
+          </a:xfrm>
+          <a:prstGeom prst="rect">
+            <a:avLst/>
+          </a:prstGeom>
+          <a:noFill/>
+        </p:spPr>
+        <p:txBody>
+          <a:bodyPr wrap="square" rtlCol="0">
+            <a:spAutoFit/>
+          </a:bodyPr>
+          <a:lstStyle/>
+          <a:p>
+            <a:r>
+              <a:rPr lang="en-US" sz="1050" dirty="0"/>
+              <a:t>Figure 5.</a:t>
+            </a:r>
+          </a:p>
+        </p:txBody>
+      </p:sp>
     </p:spTree>
     <p:extLst>
       <p:ext uri="{BB962C8B-B14F-4D97-AF65-F5344CB8AC3E}">
@@ -5393,7 +6418,7 @@
 </p:sld>
 </file>
 
-<file path=ppt/slides/slide13.xml><?xml version="1.0" encoding="utf-8"?>
+<file path=ppt/slides/slide18.xml><?xml version="1.0" encoding="utf-8"?>
 <p:sld xmlns:a="http://schemas.openxmlformats.org/drawingml/2006/main" xmlns:r="http://schemas.openxmlformats.org/officeDocument/2006/relationships" xmlns:p="http://schemas.openxmlformats.org/presentationml/2006/main">
   <p:cSld>
     <p:spTree>
@@ -5544,7 +6569,7 @@
             <a:fld id="{610C4E4B-DC7F-8F40-B47C-DF522102C54B}" type="slidenum">
               <a:rPr lang="sv-SE" smtClean="0"/>
               <a:pPr/>
-              <a:t>13</a:t>
+              <a:t>18</a:t>
             </a:fld>
             <a:endParaRPr lang="sv-SE"/>
           </a:p>
@@ -5563,7 +6588,7 @@
 </p:sld>
 </file>
 
-<file path=ppt/slides/slide14.xml><?xml version="1.0" encoding="utf-8"?>
+<file path=ppt/slides/slide19.xml><?xml version="1.0" encoding="utf-8"?>
 <p:sld xmlns:a="http://schemas.openxmlformats.org/drawingml/2006/main" xmlns:r="http://schemas.openxmlformats.org/officeDocument/2006/relationships" xmlns:p="http://schemas.openxmlformats.org/presentationml/2006/main">
   <p:cSld>
     <p:spTree>
@@ -5678,7 +6703,7 @@
             <a:fld id="{610C4E4B-DC7F-8F40-B47C-DF522102C54B}" type="slidenum">
               <a:rPr lang="sv-SE" smtClean="0"/>
               <a:pPr/>
-              <a:t>14</a:t>
+              <a:t>19</a:t>
             </a:fld>
             <a:endParaRPr lang="sv-SE"/>
           </a:p>
@@ -5931,7 +6956,182 @@
 </p:sld>
 </file>
 
-<file path=ppt/slides/slide15.xml><?xml version="1.0" encoding="utf-8"?>
+<file path=ppt/slides/slide2.xml><?xml version="1.0" encoding="utf-8"?>
+<p:sld xmlns:a="http://schemas.openxmlformats.org/drawingml/2006/main" xmlns:r="http://schemas.openxmlformats.org/officeDocument/2006/relationships" xmlns:p="http://schemas.openxmlformats.org/presentationml/2006/main">
+  <p:cSld>
+    <p:spTree>
+      <p:nvGrpSpPr>
+        <p:cNvPr id="1" name="">
+          <a:extLst>
+            <a:ext uri="{FF2B5EF4-FFF2-40B4-BE49-F238E27FC236}">
+              <a16:creationId xmlns:a16="http://schemas.microsoft.com/office/drawing/2014/main" id="{8ADD2F7B-1039-EF81-2A74-2373EFE74463}"/>
+            </a:ext>
+          </a:extLst>
+        </p:cNvPr>
+        <p:cNvGrpSpPr/>
+        <p:nvPr/>
+      </p:nvGrpSpPr>
+      <p:grpSpPr>
+        <a:xfrm>
+          <a:off x="0" y="0"/>
+          <a:ext cx="0" cy="0"/>
+          <a:chOff x="0" y="0"/>
+          <a:chExt cx="0" cy="0"/>
+        </a:xfrm>
+      </p:grpSpPr>
+      <p:sp>
+        <p:nvSpPr>
+          <p:cNvPr id="2" name="Rubrik 1">
+            <a:extLst>
+              <a:ext uri="{FF2B5EF4-FFF2-40B4-BE49-F238E27FC236}">
+                <a16:creationId xmlns:a16="http://schemas.microsoft.com/office/drawing/2014/main" id="{0F33AAB8-6F93-9BB5-6507-1012417C6624}"/>
+              </a:ext>
+            </a:extLst>
+          </p:cNvPr>
+          <p:cNvSpPr>
+            <a:spLocks noGrp="1"/>
+          </p:cNvSpPr>
+          <p:nvPr>
+            <p:ph type="ctrTitle"/>
+          </p:nvPr>
+        </p:nvSpPr>
+        <p:spPr>
+          <a:xfrm>
+            <a:off x="267446" y="342766"/>
+            <a:ext cx="5165165" cy="631025"/>
+          </a:xfrm>
+        </p:spPr>
+        <p:txBody>
+          <a:bodyPr/>
+          <a:lstStyle/>
+          <a:p>
+            <a:r>
+              <a:rPr lang="sv-SE"/>
+              <a:t>Table </a:t>
+            </a:r>
+            <a:r>
+              <a:rPr lang="sv-SE" err="1"/>
+              <a:t>of</a:t>
+            </a:r>
+            <a:r>
+              <a:rPr lang="sv-SE"/>
+              <a:t> </a:t>
+            </a:r>
+            <a:r>
+              <a:rPr lang="sv-SE" err="1"/>
+              <a:t>contents</a:t>
+            </a:r>
+            <a:endParaRPr lang="sv-SE"/>
+          </a:p>
+        </p:txBody>
+      </p:sp>
+      <p:sp>
+        <p:nvSpPr>
+          <p:cNvPr id="3" name="Underrubrik 2">
+            <a:extLst>
+              <a:ext uri="{FF2B5EF4-FFF2-40B4-BE49-F238E27FC236}">
+                <a16:creationId xmlns:a16="http://schemas.microsoft.com/office/drawing/2014/main" id="{508E3730-DC5D-52EB-73D9-6DDAEE74FA06}"/>
+              </a:ext>
+            </a:extLst>
+          </p:cNvPr>
+          <p:cNvSpPr>
+            <a:spLocks noGrp="1"/>
+          </p:cNvSpPr>
+          <p:nvPr>
+            <p:ph type="subTitle" idx="1"/>
+          </p:nvPr>
+        </p:nvSpPr>
+        <p:spPr>
+          <a:xfrm>
+            <a:off x="403412" y="1026084"/>
+            <a:ext cx="8387976" cy="3774649"/>
+          </a:xfrm>
+        </p:spPr>
+        <p:txBody>
+          <a:bodyPr/>
+          <a:lstStyle/>
+          <a:p>
+            <a:pPr marL="457200" indent="-457200" algn="l">
+              <a:buFont typeface="+mj-lt"/>
+              <a:buAutoNum type="arabicPeriod"/>
+            </a:pPr>
+            <a:r>
+              <a:rPr lang="en-US" err="1"/>
+              <a:t>Memoization</a:t>
+            </a:r>
+            <a:endParaRPr lang="en-US"/>
+          </a:p>
+          <a:p>
+            <a:pPr marL="457200" indent="-457200" algn="l">
+              <a:buFont typeface="+mj-lt"/>
+              <a:buAutoNum type="arabicPeriod"/>
+            </a:pPr>
+            <a:r>
+              <a:rPr lang="en-US"/>
+              <a:t>Python</a:t>
+            </a:r>
+          </a:p>
+          <a:p>
+            <a:pPr marL="457200" indent="-457200" algn="l">
+              <a:buFont typeface="+mj-lt"/>
+              <a:buAutoNum type="arabicPeriod"/>
+            </a:pPr>
+            <a:r>
+              <a:rPr lang="en-US" err="1"/>
+              <a:t>PhP</a:t>
+            </a:r>
+            <a:r>
+              <a:rPr lang="en-US"/>
+              <a:t> - Laravel</a:t>
+            </a:r>
+          </a:p>
+          <a:p>
+            <a:pPr marL="457200" indent="-457200" algn="l">
+              <a:buFont typeface="+mj-lt"/>
+              <a:buAutoNum type="arabicPeriod"/>
+            </a:pPr>
+            <a:r>
+              <a:rPr lang="en-US"/>
+              <a:t>Java</a:t>
+            </a:r>
+          </a:p>
+          <a:p>
+            <a:pPr marL="457200" indent="-457200" algn="l">
+              <a:buFont typeface="+mj-lt"/>
+              <a:buAutoNum type="arabicPeriod"/>
+            </a:pPr>
+            <a:r>
+              <a:rPr lang="en-US"/>
+              <a:t>Conclusion</a:t>
+            </a:r>
+          </a:p>
+          <a:p>
+            <a:pPr marL="457200" indent="-457200" algn="l">
+              <a:buFont typeface="+mj-lt"/>
+              <a:buAutoNum type="arabicPeriod"/>
+            </a:pPr>
+            <a:r>
+              <a:rPr lang="sv-SE" err="1"/>
+              <a:t>References</a:t>
+            </a:r>
+            <a:endParaRPr lang="sv-SE"/>
+          </a:p>
+        </p:txBody>
+      </p:sp>
+    </p:spTree>
+    <p:extLst>
+      <p:ext uri="{BB962C8B-B14F-4D97-AF65-F5344CB8AC3E}">
+        <p14:creationId xmlns:p14="http://schemas.microsoft.com/office/powerpoint/2010/main" val="2439089422"/>
+      </p:ext>
+    </p:extLst>
+  </p:cSld>
+  <p:clrMapOvr>
+    <a:masterClrMapping/>
+  </p:clrMapOvr>
+</p:sld>
+</file>
+
+<file path=ppt/slides/slide20.xml><?xml version="1.0" encoding="utf-8"?>
 <p:sld xmlns:a="http://schemas.openxmlformats.org/drawingml/2006/main" xmlns:r="http://schemas.openxmlformats.org/officeDocument/2006/relationships" xmlns:p="http://schemas.openxmlformats.org/presentationml/2006/main">
   <p:cSld>
     <p:spTree>
@@ -6055,7 +7255,7 @@
             <a:fld id="{610C4E4B-DC7F-8F40-B47C-DF522102C54B}" type="slidenum">
               <a:rPr lang="sv-SE" smtClean="0"/>
               <a:pPr/>
-              <a:t>15</a:t>
+              <a:t>20</a:t>
             </a:fld>
             <a:endParaRPr lang="sv-SE"/>
           </a:p>
@@ -6104,7 +7304,7 @@
 </p:sld>
 </file>
 
-<file path=ppt/slides/slide16.xml><?xml version="1.0" encoding="utf-8"?>
+<file path=ppt/slides/slide21.xml><?xml version="1.0" encoding="utf-8"?>
 <p:sld xmlns:a="http://schemas.openxmlformats.org/drawingml/2006/main" xmlns:r="http://schemas.openxmlformats.org/officeDocument/2006/relationships" xmlns:p="http://schemas.openxmlformats.org/presentationml/2006/main">
   <p:cSld>
     <p:spTree>
@@ -6749,7 +7949,7 @@
             <a:fld id="{610C4E4B-DC7F-8F40-B47C-DF522102C54B}" type="slidenum">
               <a:rPr lang="sv-SE" smtClean="0"/>
               <a:pPr/>
-              <a:t>16</a:t>
+              <a:t>21</a:t>
             </a:fld>
             <a:endParaRPr lang="sv-SE"/>
           </a:p>
@@ -6798,7 +7998,7 @@
 </p:sld>
 </file>
 
-<file path=ppt/slides/slide17.xml><?xml version="1.0" encoding="utf-8"?>
+<file path=ppt/slides/slide22.xml><?xml version="1.0" encoding="utf-8"?>
 <p:sld xmlns:a="http://schemas.openxmlformats.org/drawingml/2006/main" xmlns:r="http://schemas.openxmlformats.org/officeDocument/2006/relationships" xmlns:p="http://schemas.openxmlformats.org/presentationml/2006/main">
   <p:cSld>
     <p:spTree>
@@ -6901,7 +8101,7 @@
             <a:fld id="{610C4E4B-DC7F-8F40-B47C-DF522102C54B}" type="slidenum">
               <a:rPr lang="sv-SE" smtClean="0"/>
               <a:pPr/>
-              <a:t>17</a:t>
+              <a:t>22</a:t>
             </a:fld>
             <a:endParaRPr lang="sv-SE"/>
           </a:p>
@@ -7515,7 +8715,7 @@
 </p:sld>
 </file>
 
-<file path=ppt/slides/slide18.xml><?xml version="1.0" encoding="utf-8"?>
+<file path=ppt/slides/slide23.xml><?xml version="1.0" encoding="utf-8"?>
 <p:sld xmlns:a="http://schemas.openxmlformats.org/drawingml/2006/main" xmlns:r="http://schemas.openxmlformats.org/officeDocument/2006/relationships" xmlns:p="http://schemas.openxmlformats.org/presentationml/2006/main">
   <p:cSld>
     <p:spTree>
@@ -7650,7 +8850,7 @@
                 <a:effectLst/>
                 <a:latin typeface="Lato" panose="020F0502020204030203" pitchFamily="34" charset="0"/>
               </a:rPr>
-              <a:t> is a simple but powerful trick that can help speed up our code, especially when dealing with repetitive and heavy computing functions”(</a:t>
+              <a:t> is a simple but powerful trick that can help speed up our code, especially when dealing with repetitive and heavy computing functions”(4</a:t>
             </a:r>
             <a:r>
               <a:rPr lang="en-GB" dirty="0">
@@ -7659,7 +8859,7 @@
                 </a:solidFill>
                 <a:latin typeface="Lato" panose="020F0502020204030203" pitchFamily="34" charset="0"/>
               </a:rPr>
-              <a:t>3)or </a:t>
+              <a:t>)or </a:t>
             </a:r>
             <a:r>
               <a:rPr lang="en-GB" b="0" i="0" dirty="0">
@@ -7669,7 +8869,7 @@
                 <a:effectLst/>
                 <a:latin typeface="Rangle Riforma"/>
               </a:rPr>
-              <a:t>or functions that are called frequently with the same input parameters(</a:t>
+              <a:t>or functions that are called frequently with the same input parameters(5</a:t>
             </a:r>
             <a:r>
               <a:rPr lang="en-GB" dirty="0">
@@ -7678,7 +8878,7 @@
                 </a:solidFill>
                 <a:latin typeface="Rangle Riforma"/>
               </a:rPr>
-              <a:t>4)</a:t>
+              <a:t>)</a:t>
             </a:r>
             <a:endParaRPr lang="en-GB" dirty="0">
               <a:solidFill>
@@ -7741,7 +8941,7 @@
                 </a:solidFill>
                 <a:latin typeface="Rangle Riforma"/>
               </a:rPr>
-              <a:t> (4)</a:t>
+              <a:t> (5)</a:t>
             </a:r>
             <a:r>
               <a:rPr lang="en-GB" b="0" i="0" dirty="0">
@@ -7770,7 +8970,7 @@
 </p:sld>
 </file>
 
-<file path=ppt/slides/slide19.xml><?xml version="1.0" encoding="utf-8"?>
+<file path=ppt/slides/slide24.xml><?xml version="1.0" encoding="utf-8"?>
 <p:sld xmlns:a="http://schemas.openxmlformats.org/drawingml/2006/main" xmlns:r="http://schemas.openxmlformats.org/officeDocument/2006/relationships" xmlns:p="http://schemas.openxmlformats.org/presentationml/2006/main">
   <p:cSld>
     <p:spTree>
@@ -7820,14 +9020,14 @@
           <a:lstStyle/>
           <a:p>
             <a:r>
-              <a:rPr lang="sv-SE"/>
+              <a:rPr lang="sv-SE" dirty="0"/>
               <a:t>6. </a:t>
             </a:r>
             <a:r>
-              <a:rPr lang="sv-SE" err="1"/>
+              <a:rPr lang="sv-SE" dirty="0" err="1"/>
               <a:t>References</a:t>
             </a:r>
-            <a:endParaRPr lang="sv-SE"/>
+            <a:endParaRPr lang="sv-SE" dirty="0"/>
           </a:p>
         </p:txBody>
       </p:sp>
@@ -7856,6 +9056,18 @@
         <p:txBody>
           <a:bodyPr/>
           <a:lstStyle/>
+          <a:p>
+            <a:pPr marL="457200" indent="-457200" algn="l">
+              <a:buFont typeface="+mj-lt"/>
+              <a:buAutoNum type="arabicPeriod"/>
+            </a:pPr>
+            <a:r>
+              <a:rPr lang="sv-SE" dirty="0">
+                <a:hlinkClick r:id="rId2"/>
+              </a:rPr>
+              <a:t>https://laravel.com</a:t>
+            </a:r>
+          </a:p>
           <a:p>
             <a:pPr marL="457200" indent="-457200" algn="l">
               <a:buFont typeface="+mj-lt"/>
@@ -7944,7 +9156,7 @@
 </p:sld>
 </file>
 
-<file path=ppt/slides/slide2.xml><?xml version="1.0" encoding="utf-8"?>
+<file path=ppt/slides/slide25.xml><?xml version="1.0" encoding="utf-8"?>
 <p:sld xmlns:a="http://schemas.openxmlformats.org/drawingml/2006/main" xmlns:r="http://schemas.openxmlformats.org/officeDocument/2006/relationships" xmlns:p="http://schemas.openxmlformats.org/presentationml/2006/main">
   <p:cSld>
     <p:spTree>
@@ -7952,7 +9164,7 @@
         <p:cNvPr id="1" name="">
           <a:extLst>
             <a:ext uri="{FF2B5EF4-FFF2-40B4-BE49-F238E27FC236}">
-              <a16:creationId xmlns:a16="http://schemas.microsoft.com/office/drawing/2014/main" id="{8ADD2F7B-1039-EF81-2A74-2373EFE74463}"/>
+              <a16:creationId xmlns:a16="http://schemas.microsoft.com/office/drawing/2014/main" id="{841046E2-9A04-595F-6D2F-B675EF01551D}"/>
             </a:ext>
           </a:extLst>
         </p:cNvPr>
@@ -7972,7 +9184,7 @@
           <p:cNvPr id="2" name="Rubrik 1">
             <a:extLst>
               <a:ext uri="{FF2B5EF4-FFF2-40B4-BE49-F238E27FC236}">
-                <a16:creationId xmlns:a16="http://schemas.microsoft.com/office/drawing/2014/main" id="{0F33AAB8-6F93-9BB5-6507-1012417C6624}"/>
+                <a16:creationId xmlns:a16="http://schemas.microsoft.com/office/drawing/2014/main" id="{4659B7BB-7DFD-B74D-4332-FF1C2395AD0C}"/>
               </a:ext>
             </a:extLst>
           </p:cNvPr>
@@ -7986,7 +9198,7 @@
         <p:spPr>
           <a:xfrm>
             <a:off x="267446" y="342766"/>
-            <a:ext cx="5165165" cy="631025"/>
+            <a:ext cx="5901341" cy="631025"/>
           </a:xfrm>
         </p:spPr>
         <p:txBody>
@@ -7994,22 +9206,22 @@
           <a:lstStyle/>
           <a:p>
             <a:r>
-              <a:rPr lang="sv-SE"/>
-              <a:t>Table </a:t>
-            </a:r>
-            <a:r>
-              <a:rPr lang="sv-SE" err="1"/>
-              <a:t>of</a:t>
-            </a:r>
-            <a:r>
-              <a:rPr lang="sv-SE"/>
-              <a:t> </a:t>
-            </a:r>
-            <a:r>
-              <a:rPr lang="sv-SE" err="1"/>
-              <a:t>contents</a:t>
-            </a:r>
-            <a:endParaRPr lang="sv-SE"/>
+              <a:rPr lang="sv-SE" dirty="0"/>
+              <a:t>6. </a:t>
+            </a:r>
+            <a:r>
+              <a:rPr lang="sv-SE" dirty="0" err="1"/>
+              <a:t>References</a:t>
+            </a:r>
+            <a:r>
+              <a:rPr lang="sv-SE" dirty="0"/>
+              <a:t> - </a:t>
+            </a:r>
+            <a:r>
+              <a:rPr lang="sv-SE" dirty="0" err="1"/>
+              <a:t>Figures</a:t>
+            </a:r>
+            <a:endParaRPr lang="sv-SE" dirty="0"/>
           </a:p>
         </p:txBody>
       </p:sp>
@@ -8018,7 +9230,7 @@
           <p:cNvPr id="3" name="Underrubrik 2">
             <a:extLst>
               <a:ext uri="{FF2B5EF4-FFF2-40B4-BE49-F238E27FC236}">
-                <a16:creationId xmlns:a16="http://schemas.microsoft.com/office/drawing/2014/main" id="{508E3730-DC5D-52EB-73D9-6DDAEE74FA06}"/>
+                <a16:creationId xmlns:a16="http://schemas.microsoft.com/office/drawing/2014/main" id="{10C0AE91-DA29-9260-5C8D-25A059441F56}"/>
               </a:ext>
             </a:extLst>
           </p:cNvPr>
@@ -8044,10 +9256,11 @@
               <a:buAutoNum type="arabicPeriod"/>
             </a:pPr>
             <a:r>
-              <a:rPr lang="en-US" err="1"/>
-              <a:t>Memoization</a:t>
-            </a:r>
-            <a:endParaRPr lang="en-US"/>
+              <a:rPr lang="sv-SE" dirty="0">
+                <a:hlinkClick r:id="rId2"/>
+              </a:rPr>
+              <a:t>https://en.m.wikipedia.org/wiki/File:Python_logo_and_wordmark.svg </a:t>
+            </a:r>
           </a:p>
           <a:p>
             <a:pPr marL="457200" indent="-457200" algn="l">
@@ -8055,8 +9268,10 @@
               <a:buAutoNum type="arabicPeriod"/>
             </a:pPr>
             <a:r>
-              <a:rPr lang="en-US"/>
-              <a:t>Python</a:t>
+              <a:rPr lang="sv-SE" dirty="0">
+                <a:hlinkClick r:id="rId3"/>
+              </a:rPr>
+              <a:t>https://www.linkedin.com/pulse/laravel-introduction-ch-khuram-bashir/ </a:t>
             </a:r>
           </a:p>
           <a:p>
@@ -8065,12 +9280,10 @@
               <a:buAutoNum type="arabicPeriod"/>
             </a:pPr>
             <a:r>
-              <a:rPr lang="en-US" err="1"/>
-              <a:t>PhP</a:t>
-            </a:r>
-            <a:r>
-              <a:rPr lang="en-US"/>
-              <a:t> - Laravel</a:t>
+              <a:rPr lang="sv-SE" dirty="0">
+                <a:hlinkClick r:id="rId3"/>
+              </a:rPr>
+              <a:t>https://vmssoftware.com/products/memcached/ </a:t>
             </a:r>
           </a:p>
           <a:p>
@@ -8079,8 +9292,10 @@
               <a:buAutoNum type="arabicPeriod"/>
             </a:pPr>
             <a:r>
-              <a:rPr lang="en-US"/>
-              <a:t>Java</a:t>
+              <a:rPr lang="sv-SE" dirty="0">
+                <a:hlinkClick r:id="rId3"/>
+              </a:rPr>
+              <a:t>https://www.logo.wine/logo/Redis </a:t>
             </a:r>
           </a:p>
           <a:p>
@@ -8089,27 +9304,33 @@
               <a:buAutoNum type="arabicPeriod"/>
             </a:pPr>
             <a:r>
-              <a:rPr lang="en-US"/>
-              <a:t>Conclusion</a:t>
-            </a:r>
-          </a:p>
-          <a:p>
-            <a:pPr marL="457200" indent="-457200" algn="l">
-              <a:buFont typeface="+mj-lt"/>
-              <a:buAutoNum type="arabicPeriod"/>
+              <a:rPr lang="sv-SE" dirty="0">
+                <a:hlinkClick r:id="rId3"/>
+              </a:rPr>
+              <a:t>https://sandaacademy.com/sa-training-courses/programmingwithjava/ </a:t>
+            </a:r>
+            <a:endParaRPr lang="sv-SE" dirty="0"/>
+          </a:p>
+          <a:p>
+            <a:pPr marL="342900" indent="-342900" algn="l">
+              <a:buFont typeface="Arial" panose="020B0604020202020204" pitchFamily="34" charset="0"/>
+              <a:buChar char="•"/>
             </a:pPr>
-            <a:r>
-              <a:rPr lang="sv-SE" err="1"/>
-              <a:t>References</a:t>
-            </a:r>
-            <a:endParaRPr lang="sv-SE"/>
+            <a:endParaRPr lang="sv-SE" dirty="0"/>
+          </a:p>
+          <a:p>
+            <a:pPr marL="342900" indent="-342900" algn="l">
+              <a:buFont typeface="Arial" panose="020B0604020202020204" pitchFamily="34" charset="0"/>
+              <a:buChar char="•"/>
+            </a:pPr>
+            <a:endParaRPr lang="sv-SE" dirty="0"/>
           </a:p>
         </p:txBody>
       </p:sp>
     </p:spTree>
     <p:extLst>
       <p:ext uri="{BB962C8B-B14F-4D97-AF65-F5344CB8AC3E}">
-        <p14:creationId xmlns:p14="http://schemas.microsoft.com/office/powerpoint/2010/main" val="2439089422"/>
+        <p14:creationId xmlns:p14="http://schemas.microsoft.com/office/powerpoint/2010/main" val="2212545821"/>
       </p:ext>
     </p:extLst>
   </p:cSld>
@@ -8663,6 +9884,41 @@
           </a:extLst>
         </p:spPr>
       </p:pic>
+      <p:sp>
+        <p:nvSpPr>
+          <p:cNvPr id="4" name="TextBox 3">
+            <a:extLst>
+              <a:ext uri="{FF2B5EF4-FFF2-40B4-BE49-F238E27FC236}">
+                <a16:creationId xmlns:a16="http://schemas.microsoft.com/office/drawing/2014/main" id="{5D17FCF9-D370-40ED-6E4B-B808A7104F1C}"/>
+              </a:ext>
+            </a:extLst>
+          </p:cNvPr>
+          <p:cNvSpPr txBox="1"/>
+          <p:nvPr/>
+        </p:nvSpPr>
+        <p:spPr>
+          <a:xfrm>
+            <a:off x="5479574" y="4117416"/>
+            <a:ext cx="880281" cy="253916"/>
+          </a:xfrm>
+          <a:prstGeom prst="rect">
+            <a:avLst/>
+          </a:prstGeom>
+          <a:noFill/>
+        </p:spPr>
+        <p:txBody>
+          <a:bodyPr wrap="square" rtlCol="0">
+            <a:spAutoFit/>
+          </a:bodyPr>
+          <a:lstStyle/>
+          <a:p>
+            <a:r>
+              <a:rPr lang="en-US" sz="1050" dirty="0"/>
+              <a:t>Figure 1.</a:t>
+            </a:r>
+          </a:p>
+        </p:txBody>
+      </p:sp>
     </p:spTree>
     <p:extLst>
       <p:ext uri="{BB962C8B-B14F-4D97-AF65-F5344CB8AC3E}">
@@ -9442,7 +10698,7 @@
               <a:buChar char="•"/>
             </a:pPr>
             <a:r>
-              <a:rPr lang="en-US"/>
+              <a:rPr lang="en-US" dirty="0"/>
               <a:t>What is Laravel?</a:t>
             </a:r>
           </a:p>
@@ -9452,7 +10708,7 @@
               <a:buChar char="•"/>
             </a:pPr>
             <a:r>
-              <a:rPr lang="en-US"/>
+              <a:rPr lang="en-US" dirty="0"/>
               <a:t>Different caching methods</a:t>
             </a:r>
           </a:p>
@@ -9462,8 +10718,12 @@
               <a:buChar char="•"/>
             </a:pPr>
             <a:r>
-              <a:rPr lang="en-US"/>
-              <a:t>Code</a:t>
+              <a:rPr lang="sv-SE" dirty="0" err="1"/>
+              <a:t>Loading</a:t>
+            </a:r>
+            <a:r>
+              <a:rPr lang="sv-SE" dirty="0"/>
+              <a:t> the site</a:t>
             </a:r>
           </a:p>
           <a:p>
@@ -9471,7 +10731,45 @@
               <a:buFont typeface="Arial" panose="020B0604020202020204" pitchFamily="34" charset="0"/>
               <a:buChar char="•"/>
             </a:pPr>
-            <a:endParaRPr lang="sv-SE"/>
+            <a:r>
+              <a:rPr lang="sv-SE" dirty="0"/>
+              <a:t>From cache to </a:t>
+            </a:r>
+            <a:r>
+              <a:rPr lang="sv-SE" dirty="0" err="1"/>
+              <a:t>usage</a:t>
+            </a:r>
+            <a:endParaRPr lang="sv-SE" dirty="0"/>
+          </a:p>
+          <a:p>
+            <a:pPr marL="342900" indent="-342900" algn="l">
+              <a:buFont typeface="Arial" panose="020B0604020202020204" pitchFamily="34" charset="0"/>
+              <a:buChar char="•"/>
+            </a:pPr>
+            <a:r>
+              <a:rPr lang="sv-SE" dirty="0" err="1"/>
+              <a:t>Selecting</a:t>
+            </a:r>
+            <a:r>
+              <a:rPr lang="sv-SE" dirty="0"/>
+              <a:t> services - </a:t>
+            </a:r>
+            <a:r>
+              <a:rPr lang="sv-SE" dirty="0" err="1"/>
+              <a:t>with</a:t>
+            </a:r>
+            <a:r>
+              <a:rPr lang="sv-SE" dirty="0"/>
+              <a:t> and </a:t>
+            </a:r>
+            <a:r>
+              <a:rPr lang="sv-SE" dirty="0" err="1"/>
+              <a:t>without</a:t>
+            </a:r>
+            <a:r>
+              <a:rPr lang="sv-SE" dirty="0"/>
+              <a:t> cache</a:t>
+            </a:r>
           </a:p>
         </p:txBody>
       </p:sp>
@@ -9497,14 +10795,49 @@
         </p:blipFill>
         <p:spPr>
           <a:xfrm>
-            <a:off x="2942986" y="2498312"/>
-            <a:ext cx="4947988" cy="1828605"/>
+            <a:off x="4511676" y="800239"/>
+            <a:ext cx="4228912" cy="1562859"/>
           </a:xfrm>
           <a:prstGeom prst="rect">
             <a:avLst/>
           </a:prstGeom>
         </p:spPr>
       </p:pic>
+      <p:sp>
+        <p:nvSpPr>
+          <p:cNvPr id="5" name="TextBox 4">
+            <a:extLst>
+              <a:ext uri="{FF2B5EF4-FFF2-40B4-BE49-F238E27FC236}">
+                <a16:creationId xmlns:a16="http://schemas.microsoft.com/office/drawing/2014/main" id="{2D2B5C89-4B9E-8284-7F63-459557945B63}"/>
+              </a:ext>
+            </a:extLst>
+          </p:cNvPr>
+          <p:cNvSpPr txBox="1"/>
+          <p:nvPr/>
+        </p:nvSpPr>
+        <p:spPr>
+          <a:xfrm>
+            <a:off x="6185991" y="2236140"/>
+            <a:ext cx="880281" cy="253916"/>
+          </a:xfrm>
+          <a:prstGeom prst="rect">
+            <a:avLst/>
+          </a:prstGeom>
+          <a:noFill/>
+        </p:spPr>
+        <p:txBody>
+          <a:bodyPr wrap="square" rtlCol="0">
+            <a:spAutoFit/>
+          </a:bodyPr>
+          <a:lstStyle/>
+          <a:p>
+            <a:r>
+              <a:rPr lang="en-US" sz="1050" dirty="0"/>
+              <a:t>Figure 2.</a:t>
+            </a:r>
+          </a:p>
+        </p:txBody>
+      </p:sp>
     </p:spTree>
     <p:extLst>
       <p:ext uri="{BB962C8B-B14F-4D97-AF65-F5344CB8AC3E}">
@@ -10480,15 +11813,6 @@
 </file>
 
 <file path=customXml/item1.xml><?xml version="1.0" encoding="utf-8"?>
-<?mso-contentType ?>
-<FormTemplates xmlns="http://schemas.microsoft.com/sharepoint/v3/contenttype/forms">
-  <Display>DocumentLibraryForm</Display>
-  <Edit>DocumentLibraryForm</Edit>
-  <New>DocumentLibraryForm</New>
-</FormTemplates>
-</file>
-
-<file path=customXml/item2.xml><?xml version="1.0" encoding="utf-8"?>
 <ct:contentTypeSchema xmlns:ct="http://schemas.microsoft.com/office/2006/metadata/contentType" xmlns:ma="http://schemas.microsoft.com/office/2006/metadata/properties/metaAttributes" ct:_="" ma:_="" ma:contentTypeName="dokument" ma:contentTypeID="0x010100830AFD53EA4FAC4B93D1BAD879B4B205" ma:contentTypeVersion="20" ma:contentTypeDescription="Skapa ett nytt dokument." ma:contentTypeScope="" ma:versionID="d20458860b4e67c8a989bb88ba1189b9">
   <xsd:schema xmlns:xsd="http://www.w3.org/2001/XMLSchema" xmlns:xs="http://www.w3.org/2001/XMLSchema" xmlns:p="http://schemas.microsoft.com/office/2006/metadata/properties" xmlns:ns2="a27dfd0f-a6f2-4712-9137-d9a404cddc60" xmlns:ns3="661728cc-f8de-4546-bc23-5f5fdbb4708e" targetNamespace="http://schemas.microsoft.com/office/2006/metadata/properties" ma:root="true" ma:fieldsID="704e11bb582ec7a1851f532e774c0983" ns2:_="" ns3:_="">
     <xsd:import namespace="a27dfd0f-a6f2-4712-9137-d9a404cddc60"/>
@@ -10709,6 +12033,15 @@
 </ct:contentTypeSchema>
 </file>
 
+<file path=customXml/item2.xml><?xml version="1.0" encoding="utf-8"?>
+<?mso-contentType ?>
+<FormTemplates xmlns="http://schemas.microsoft.com/sharepoint/v3/contenttype/forms">
+  <Display>DocumentLibraryForm</Display>
+  <Edit>DocumentLibraryForm</Edit>
+  <New>DocumentLibraryForm</New>
+</FormTemplates>
+</file>
+
 <file path=customXml/item3.xml><?xml version="1.0" encoding="utf-8"?>
 <p:properties xmlns:p="http://schemas.microsoft.com/office/2006/metadata/properties" xmlns:xsi="http://www.w3.org/2001/XMLSchema-instance" xmlns:pc="http://schemas.microsoft.com/office/infopath/2007/PartnerControls">
   <documentManagement>
@@ -10722,14 +12055,6 @@
 </file>
 
 <file path=customXml/itemProps1.xml><?xml version="1.0" encoding="utf-8"?>
-<ds:datastoreItem xmlns:ds="http://schemas.openxmlformats.org/officeDocument/2006/customXml" ds:itemID="{D28E330F-FAEB-43BD-88E9-B921C1D5AE7B}">
-  <ds:schemaRefs>
-    <ds:schemaRef ds:uri="http://schemas.microsoft.com/sharepoint/v3/contenttype/forms"/>
-  </ds:schemaRefs>
-</ds:datastoreItem>
-</file>
-
-<file path=customXml/itemProps2.xml><?xml version="1.0" encoding="utf-8"?>
 <ds:datastoreItem xmlns:ds="http://schemas.openxmlformats.org/officeDocument/2006/customXml" ds:itemID="{4DA24E85-69A4-40E6-B457-5DEA4943BCC4}">
   <ds:schemaRefs>
     <ds:schemaRef ds:uri="http://schemas.microsoft.com/office/2006/metadata/contentType"/>
@@ -10748,6 +12073,14 @@
 </ds:datastoreItem>
 </file>
 
+<file path=customXml/itemProps2.xml><?xml version="1.0" encoding="utf-8"?>
+<ds:datastoreItem xmlns:ds="http://schemas.openxmlformats.org/officeDocument/2006/customXml" ds:itemID="{D28E330F-FAEB-43BD-88E9-B921C1D5AE7B}">
+  <ds:schemaRefs>
+    <ds:schemaRef ds:uri="http://schemas.microsoft.com/sharepoint/v3/contenttype/forms"/>
+  </ds:schemaRefs>
+</ds:datastoreItem>
+</file>
+
 <file path=customXml/itemProps3.xml><?xml version="1.0" encoding="utf-8"?>
 <ds:datastoreItem xmlns:ds="http://schemas.openxmlformats.org/officeDocument/2006/customXml" ds:itemID="{0CF91B3D-EC90-430A-AB1E-F0238E505E8F}">
   <ds:schemaRefs>

</xml_diff>

<commit_message>
cache and not cash
</commit_message>
<xml_diff>
--- a/Groupwork ppt.pptx
+++ b/Groupwork ppt.pptx
@@ -4722,14 +4722,14 @@
           </a:ln>
           <a:extLst>
             <a:ext uri="{909E8E84-426E-40dd-AFC4-6F175D3DCCD1}">
-              <a14:hiddenFill xmlns="" xmlns:a14="http://schemas.microsoft.com/office/drawing/2010/main">
+              <a14:hiddenFill xmlns:a14="http://schemas.microsoft.com/office/drawing/2010/main" xmlns="">
                 <a:solidFill>
                   <a:srgbClr val="FFFFFF"/>
                 </a:solidFill>
               </a14:hiddenFill>
             </a:ext>
             <a:ext uri="{91240B29-F687-4f45-9708-019B960494DF}">
-              <a14:hiddenLine xmlns="" xmlns:a14="http://schemas.microsoft.com/office/drawing/2010/main" w="9525">
+              <a14:hiddenLine xmlns:a14="http://schemas.microsoft.com/office/drawing/2010/main" xmlns="" w="9525">
                 <a:solidFill>
                   <a:srgbClr val="000000"/>
                 </a:solidFill>
@@ -4739,7 +4739,7 @@
               </a14:hiddenLine>
             </a:ext>
             <a:ext uri="{FAA26D3D-D897-4be2-8F04-BA451C77F1D7}">
-              <ma14:placeholderFlag xmlns="" xmlns:ma14="http://schemas.microsoft.com/office/mac/drawingml/2011/main" val="1"/>
+              <ma14:placeholderFlag xmlns:ma14="http://schemas.microsoft.com/office/mac/drawingml/2011/main" xmlns="" val="1"/>
             </a:ext>
           </a:extLst>
         </p:spPr>
@@ -4783,14 +4783,14 @@
           </a:ln>
           <a:extLst>
             <a:ext uri="{909E8E84-426E-40dd-AFC4-6F175D3DCCD1}">
-              <a14:hiddenFill xmlns="" xmlns:a14="http://schemas.microsoft.com/office/drawing/2010/main">
+              <a14:hiddenFill xmlns:a14="http://schemas.microsoft.com/office/drawing/2010/main" xmlns="">
                 <a:solidFill>
                   <a:srgbClr val="FFFFFF"/>
                 </a:solidFill>
               </a14:hiddenFill>
             </a:ext>
             <a:ext uri="{91240B29-F687-4f45-9708-019B960494DF}">
-              <a14:hiddenLine xmlns="" xmlns:a14="http://schemas.microsoft.com/office/drawing/2010/main" w="9525">
+              <a14:hiddenLine xmlns:a14="http://schemas.microsoft.com/office/drawing/2010/main" xmlns="" w="9525">
                 <a:solidFill>
                   <a:srgbClr val="000000"/>
                 </a:solidFill>
@@ -4800,7 +4800,7 @@
               </a14:hiddenLine>
             </a:ext>
             <a:ext uri="{FAA26D3D-D897-4be2-8F04-BA451C77F1D7}">
-              <ma14:placeholderFlag xmlns="" xmlns:ma14="http://schemas.microsoft.com/office/mac/drawingml/2011/main" val="1"/>
+              <ma14:placeholderFlag xmlns:ma14="http://schemas.microsoft.com/office/mac/drawingml/2011/main" xmlns="" val="1"/>
             </a:ext>
           </a:extLst>
         </p:spPr>
@@ -7724,7 +7724,7 @@
             <a:pPr lvl="1"/>
             <a:r>
               <a:rPr lang="en-GB" sz="1400" dirty="0"/>
-              <a:t>a) key found in cash – retrieve value and update UI</a:t>
+              <a:t>a) key found in cache – retrieve value and update UI</a:t>
             </a:r>
           </a:p>
           <a:p>
@@ -8015,7 +8015,15 @@
             </a:r>
             <a:r>
               <a:rPr lang="cs-CZ" sz="1400" dirty="0"/>
-              <a:t> to cash)</a:t>
+              <a:t> to </a:t>
+            </a:r>
+            <a:r>
+              <a:rPr lang="cs-CZ" sz="1400" dirty="0" err="1"/>
+              <a:t>cache</a:t>
+            </a:r>
+            <a:r>
+              <a:rPr lang="cs-CZ" sz="1400" dirty="0"/>
+              <a:t>)</a:t>
             </a:r>
           </a:p>
           <a:p>
@@ -12343,6 +12351,15 @@
 </file>
 
 <file path=customXml/item1.xml><?xml version="1.0" encoding="utf-8"?>
+<?mso-contentType ?>
+<FormTemplates xmlns="http://schemas.microsoft.com/sharepoint/v3/contenttype/forms">
+  <Display>DocumentLibraryForm</Display>
+  <Edit>DocumentLibraryForm</Edit>
+  <New>DocumentLibraryForm</New>
+</FormTemplates>
+</file>
+
+<file path=customXml/item2.xml><?xml version="1.0" encoding="utf-8"?>
 <ct:contentTypeSchema xmlns:ct="http://schemas.microsoft.com/office/2006/metadata/contentType" xmlns:ma="http://schemas.microsoft.com/office/2006/metadata/properties/metaAttributes" ct:_="" ma:_="" ma:contentTypeName="dokument" ma:contentTypeID="0x010100830AFD53EA4FAC4B93D1BAD879B4B205" ma:contentTypeVersion="20" ma:contentTypeDescription="Skapa ett nytt dokument." ma:contentTypeScope="" ma:versionID="d20458860b4e67c8a989bb88ba1189b9">
   <xsd:schema xmlns:xsd="http://www.w3.org/2001/XMLSchema" xmlns:xs="http://www.w3.org/2001/XMLSchema" xmlns:p="http://schemas.microsoft.com/office/2006/metadata/properties" xmlns:ns2="a27dfd0f-a6f2-4712-9137-d9a404cddc60" xmlns:ns3="661728cc-f8de-4546-bc23-5f5fdbb4708e" targetNamespace="http://schemas.microsoft.com/office/2006/metadata/properties" ma:root="true" ma:fieldsID="704e11bb582ec7a1851f532e774c0983" ns2:_="" ns3:_="">
     <xsd:import namespace="a27dfd0f-a6f2-4712-9137-d9a404cddc60"/>
@@ -12563,15 +12580,6 @@
 </ct:contentTypeSchema>
 </file>
 
-<file path=customXml/item2.xml><?xml version="1.0" encoding="utf-8"?>
-<?mso-contentType ?>
-<FormTemplates xmlns="http://schemas.microsoft.com/sharepoint/v3/contenttype/forms">
-  <Display>DocumentLibraryForm</Display>
-  <Edit>DocumentLibraryForm</Edit>
-  <New>DocumentLibraryForm</New>
-</FormTemplates>
-</file>
-
 <file path=customXml/item3.xml><?xml version="1.0" encoding="utf-8"?>
 <p:properties xmlns:p="http://schemas.microsoft.com/office/2006/metadata/properties" xmlns:xsi="http://www.w3.org/2001/XMLSchema-instance" xmlns:pc="http://schemas.microsoft.com/office/infopath/2007/PartnerControls">
   <documentManagement>
@@ -12585,6 +12593,14 @@
 </file>
 
 <file path=customXml/itemProps1.xml><?xml version="1.0" encoding="utf-8"?>
+<ds:datastoreItem xmlns:ds="http://schemas.openxmlformats.org/officeDocument/2006/customXml" ds:itemID="{D28E330F-FAEB-43BD-88E9-B921C1D5AE7B}">
+  <ds:schemaRefs>
+    <ds:schemaRef ds:uri="http://schemas.microsoft.com/sharepoint/v3/contenttype/forms"/>
+  </ds:schemaRefs>
+</ds:datastoreItem>
+</file>
+
+<file path=customXml/itemProps2.xml><?xml version="1.0" encoding="utf-8"?>
 <ds:datastoreItem xmlns:ds="http://schemas.openxmlformats.org/officeDocument/2006/customXml" ds:itemID="{4DA24E85-69A4-40E6-B457-5DEA4943BCC4}">
   <ds:schemaRefs>
     <ds:schemaRef ds:uri="http://schemas.microsoft.com/office/2006/metadata/contentType"/>
@@ -12603,14 +12619,6 @@
 </ds:datastoreItem>
 </file>
 
-<file path=customXml/itemProps2.xml><?xml version="1.0" encoding="utf-8"?>
-<ds:datastoreItem xmlns:ds="http://schemas.openxmlformats.org/officeDocument/2006/customXml" ds:itemID="{D28E330F-FAEB-43BD-88E9-B921C1D5AE7B}">
-  <ds:schemaRefs>
-    <ds:schemaRef ds:uri="http://schemas.microsoft.com/sharepoint/v3/contenttype/forms"/>
-  </ds:schemaRefs>
-</ds:datastoreItem>
-</file>
-
 <file path=customXml/itemProps3.xml><?xml version="1.0" encoding="utf-8"?>
 <ds:datastoreItem xmlns:ds="http://schemas.openxmlformats.org/officeDocument/2006/customXml" ds:itemID="{0CF91B3D-EC90-430A-AB1E-F0238E505E8F}">
   <ds:schemaRefs>

</xml_diff>